<commit_message>
Added notes to the slides.
</commit_message>
<xml_diff>
--- a/docs/presentation/presentation.pptx
+++ b/docs/presentation/presentation.pptx
@@ -4,6 +4,9 @@
   <p:sldMasterIdLst>
     <p:sldMasterId id="2147484119" r:id="rId1"/>
   </p:sldMasterIdLst>
+  <p:notesMasterIdLst>
+    <p:notesMasterId r:id="rId21"/>
+  </p:notesMasterIdLst>
   <p:sldIdLst>
     <p:sldId id="259" r:id="rId2"/>
     <p:sldId id="258" r:id="rId3"/>
@@ -152,7 +155,2465 @@
       </a:defRPr>
     </a:lvl9pPr>
   </p:defaultTextStyle>
+  <p:extLst>
+    <p:ext uri="{EFAFB233-063F-42B5-8137-9DF3F51BA10A}">
+      <p15:sldGuideLst xmlns:p15="http://schemas.microsoft.com/office/powerpoint/2012/main">
+        <p15:guide id="1" orient="horz" pos="2041">
+          <p15:clr>
+            <a:srgbClr val="A4A3A4"/>
+          </p15:clr>
+        </p15:guide>
+        <p15:guide id="2" pos="3629">
+          <p15:clr>
+            <a:srgbClr val="A4A3A4"/>
+          </p15:clr>
+        </p15:guide>
+      </p15:sldGuideLst>
+    </p:ext>
+  </p:extLst>
 </p:presentation>
+</file>
+
+<file path=ppt/notesMasters/notesMaster1.xml><?xml version="1.0" encoding="utf-8"?>
+<p:notesMaster xmlns:a="http://schemas.openxmlformats.org/drawingml/2006/main" xmlns:r="http://schemas.openxmlformats.org/officeDocument/2006/relationships" xmlns:p="http://schemas.openxmlformats.org/presentationml/2006/main">
+  <p:cSld>
+    <p:bg>
+      <p:bgRef idx="1001">
+        <a:schemeClr val="bg1"/>
+      </p:bgRef>
+    </p:bg>
+    <p:spTree>
+      <p:nvGrpSpPr>
+        <p:cNvPr id="1" name=""/>
+        <p:cNvGrpSpPr/>
+        <p:nvPr/>
+      </p:nvGrpSpPr>
+      <p:grpSpPr>
+        <a:xfrm>
+          <a:off x="0" y="0"/>
+          <a:ext cx="0" cy="0"/>
+          <a:chOff x="0" y="0"/>
+          <a:chExt cx="0" cy="0"/>
+        </a:xfrm>
+      </p:grpSpPr>
+      <p:sp>
+        <p:nvSpPr>
+          <p:cNvPr id="2" name="Header Placeholder 1"/>
+          <p:cNvSpPr>
+            <a:spLocks noGrp="1"/>
+          </p:cNvSpPr>
+          <p:nvPr>
+            <p:ph type="hdr" sz="quarter"/>
+          </p:nvPr>
+        </p:nvSpPr>
+        <p:spPr>
+          <a:xfrm>
+            <a:off x="0" y="0"/>
+            <a:ext cx="2971800" cy="458788"/>
+          </a:xfrm>
+          <a:prstGeom prst="rect">
+            <a:avLst/>
+          </a:prstGeom>
+        </p:spPr>
+        <p:txBody>
+          <a:bodyPr vert="horz" lIns="91440" tIns="45720" rIns="91440" bIns="45720" rtlCol="0"/>
+          <a:lstStyle>
+            <a:lvl1pPr algn="l">
+              <a:defRPr sz="1200"/>
+            </a:lvl1pPr>
+          </a:lstStyle>
+          <a:p>
+            <a:endParaRPr lang="nl-NL"/>
+          </a:p>
+        </p:txBody>
+      </p:sp>
+      <p:sp>
+        <p:nvSpPr>
+          <p:cNvPr id="3" name="Date Placeholder 2"/>
+          <p:cNvSpPr>
+            <a:spLocks noGrp="1"/>
+          </p:cNvSpPr>
+          <p:nvPr>
+            <p:ph type="dt" idx="1"/>
+          </p:nvPr>
+        </p:nvSpPr>
+        <p:spPr>
+          <a:xfrm>
+            <a:off x="3884613" y="0"/>
+            <a:ext cx="2971800" cy="458788"/>
+          </a:xfrm>
+          <a:prstGeom prst="rect">
+            <a:avLst/>
+          </a:prstGeom>
+        </p:spPr>
+        <p:txBody>
+          <a:bodyPr vert="horz" lIns="91440" tIns="45720" rIns="91440" bIns="45720" rtlCol="0"/>
+          <a:lstStyle>
+            <a:lvl1pPr algn="r">
+              <a:defRPr sz="1200"/>
+            </a:lvl1pPr>
+          </a:lstStyle>
+          <a:p>
+            <a:fld id="{3DC61A06-521D-4FE1-AFC2-E9A441FAFEB1}" type="datetimeFigureOut">
+              <a:rPr lang="nl-NL" smtClean="0"/>
+              <a:t>25-6-2015</a:t>
+            </a:fld>
+            <a:endParaRPr lang="nl-NL"/>
+          </a:p>
+        </p:txBody>
+      </p:sp>
+      <p:sp>
+        <p:nvSpPr>
+          <p:cNvPr id="4" name="Slide Image Placeholder 3"/>
+          <p:cNvSpPr>
+            <a:spLocks noGrp="1" noRot="1" noChangeAspect="1"/>
+          </p:cNvSpPr>
+          <p:nvPr>
+            <p:ph type="sldImg" idx="2"/>
+          </p:nvPr>
+        </p:nvSpPr>
+        <p:spPr>
+          <a:xfrm>
+            <a:off x="685800" y="1143000"/>
+            <a:ext cx="5486400" cy="3086100"/>
+          </a:xfrm>
+          <a:prstGeom prst="rect">
+            <a:avLst/>
+          </a:prstGeom>
+          <a:noFill/>
+          <a:ln w="12700">
+            <a:solidFill>
+              <a:prstClr val="black"/>
+            </a:solidFill>
+          </a:ln>
+        </p:spPr>
+        <p:txBody>
+          <a:bodyPr vert="horz" lIns="91440" tIns="45720" rIns="91440" bIns="45720" rtlCol="0" anchor="ctr"/>
+          <a:lstStyle/>
+          <a:p>
+            <a:endParaRPr lang="nl-NL"/>
+          </a:p>
+        </p:txBody>
+      </p:sp>
+      <p:sp>
+        <p:nvSpPr>
+          <p:cNvPr id="5" name="Notes Placeholder 4"/>
+          <p:cNvSpPr>
+            <a:spLocks noGrp="1"/>
+          </p:cNvSpPr>
+          <p:nvPr>
+            <p:ph type="body" sz="quarter" idx="3"/>
+          </p:nvPr>
+        </p:nvSpPr>
+        <p:spPr>
+          <a:xfrm>
+            <a:off x="685800" y="4400550"/>
+            <a:ext cx="5486400" cy="3600450"/>
+          </a:xfrm>
+          <a:prstGeom prst="rect">
+            <a:avLst/>
+          </a:prstGeom>
+        </p:spPr>
+        <p:txBody>
+          <a:bodyPr vert="horz" lIns="91440" tIns="45720" rIns="91440" bIns="45720" rtlCol="0"/>
+          <a:lstStyle/>
+          <a:p>
+            <a:pPr lvl="0"/>
+            <a:r>
+              <a:rPr lang="en-US" smtClean="0"/>
+              <a:t>Click to edit Master text styles</a:t>
+            </a:r>
+          </a:p>
+          <a:p>
+            <a:pPr lvl="1"/>
+            <a:r>
+              <a:rPr lang="en-US" smtClean="0"/>
+              <a:t>Second level</a:t>
+            </a:r>
+          </a:p>
+          <a:p>
+            <a:pPr lvl="2"/>
+            <a:r>
+              <a:rPr lang="en-US" smtClean="0"/>
+              <a:t>Third level</a:t>
+            </a:r>
+          </a:p>
+          <a:p>
+            <a:pPr lvl="3"/>
+            <a:r>
+              <a:rPr lang="en-US" smtClean="0"/>
+              <a:t>Fourth level</a:t>
+            </a:r>
+          </a:p>
+          <a:p>
+            <a:pPr lvl="4"/>
+            <a:r>
+              <a:rPr lang="en-US" smtClean="0"/>
+              <a:t>Fifth level</a:t>
+            </a:r>
+            <a:endParaRPr lang="nl-NL"/>
+          </a:p>
+        </p:txBody>
+      </p:sp>
+      <p:sp>
+        <p:nvSpPr>
+          <p:cNvPr id="6" name="Footer Placeholder 5"/>
+          <p:cNvSpPr>
+            <a:spLocks noGrp="1"/>
+          </p:cNvSpPr>
+          <p:nvPr>
+            <p:ph type="ftr" sz="quarter" idx="4"/>
+          </p:nvPr>
+        </p:nvSpPr>
+        <p:spPr>
+          <a:xfrm>
+            <a:off x="0" y="8685213"/>
+            <a:ext cx="2971800" cy="458787"/>
+          </a:xfrm>
+          <a:prstGeom prst="rect">
+            <a:avLst/>
+          </a:prstGeom>
+        </p:spPr>
+        <p:txBody>
+          <a:bodyPr vert="horz" lIns="91440" tIns="45720" rIns="91440" bIns="45720" rtlCol="0" anchor="b"/>
+          <a:lstStyle>
+            <a:lvl1pPr algn="l">
+              <a:defRPr sz="1200"/>
+            </a:lvl1pPr>
+          </a:lstStyle>
+          <a:p>
+            <a:endParaRPr lang="nl-NL"/>
+          </a:p>
+        </p:txBody>
+      </p:sp>
+      <p:sp>
+        <p:nvSpPr>
+          <p:cNvPr id="7" name="Slide Number Placeholder 6"/>
+          <p:cNvSpPr>
+            <a:spLocks noGrp="1"/>
+          </p:cNvSpPr>
+          <p:nvPr>
+            <p:ph type="sldNum" sz="quarter" idx="5"/>
+          </p:nvPr>
+        </p:nvSpPr>
+        <p:spPr>
+          <a:xfrm>
+            <a:off x="3884613" y="8685213"/>
+            <a:ext cx="2971800" cy="458787"/>
+          </a:xfrm>
+          <a:prstGeom prst="rect">
+            <a:avLst/>
+          </a:prstGeom>
+        </p:spPr>
+        <p:txBody>
+          <a:bodyPr vert="horz" lIns="91440" tIns="45720" rIns="91440" bIns="45720" rtlCol="0" anchor="b"/>
+          <a:lstStyle>
+            <a:lvl1pPr algn="r">
+              <a:defRPr sz="1200"/>
+            </a:lvl1pPr>
+          </a:lstStyle>
+          <a:p>
+            <a:fld id="{2EDF4D38-89ED-4567-AF2A-BD465BA01217}" type="slidenum">
+              <a:rPr lang="nl-NL" smtClean="0"/>
+              <a:t>‹#›</a:t>
+            </a:fld>
+            <a:endParaRPr lang="nl-NL"/>
+          </a:p>
+        </p:txBody>
+      </p:sp>
+    </p:spTree>
+    <p:extLst>
+      <p:ext uri="{BB962C8B-B14F-4D97-AF65-F5344CB8AC3E}">
+        <p14:creationId xmlns:p14="http://schemas.microsoft.com/office/powerpoint/2010/main" val="2247352199"/>
+      </p:ext>
+    </p:extLst>
+  </p:cSld>
+  <p:clrMap bg1="lt1" tx1="dk1" bg2="lt2" tx2="dk2" accent1="accent1" accent2="accent2" accent3="accent3" accent4="accent4" accent5="accent5" accent6="accent6" hlink="hlink" folHlink="folHlink"/>
+  <p:notesStyle>
+    <a:lvl1pPr marL="0" algn="l" defTabSz="914400" rtl="0" eaLnBrk="1" latinLnBrk="0" hangingPunct="1">
+      <a:defRPr sz="1200" kern="1200">
+        <a:solidFill>
+          <a:schemeClr val="tx1"/>
+        </a:solidFill>
+        <a:latin typeface="+mn-lt"/>
+        <a:ea typeface="+mn-ea"/>
+        <a:cs typeface="+mn-cs"/>
+      </a:defRPr>
+    </a:lvl1pPr>
+    <a:lvl2pPr marL="457200" algn="l" defTabSz="914400" rtl="0" eaLnBrk="1" latinLnBrk="0" hangingPunct="1">
+      <a:defRPr sz="1200" kern="1200">
+        <a:solidFill>
+          <a:schemeClr val="tx1"/>
+        </a:solidFill>
+        <a:latin typeface="+mn-lt"/>
+        <a:ea typeface="+mn-ea"/>
+        <a:cs typeface="+mn-cs"/>
+      </a:defRPr>
+    </a:lvl2pPr>
+    <a:lvl3pPr marL="914400" algn="l" defTabSz="914400" rtl="0" eaLnBrk="1" latinLnBrk="0" hangingPunct="1">
+      <a:defRPr sz="1200" kern="1200">
+        <a:solidFill>
+          <a:schemeClr val="tx1"/>
+        </a:solidFill>
+        <a:latin typeface="+mn-lt"/>
+        <a:ea typeface="+mn-ea"/>
+        <a:cs typeface="+mn-cs"/>
+      </a:defRPr>
+    </a:lvl3pPr>
+    <a:lvl4pPr marL="1371600" algn="l" defTabSz="914400" rtl="0" eaLnBrk="1" latinLnBrk="0" hangingPunct="1">
+      <a:defRPr sz="1200" kern="1200">
+        <a:solidFill>
+          <a:schemeClr val="tx1"/>
+        </a:solidFill>
+        <a:latin typeface="+mn-lt"/>
+        <a:ea typeface="+mn-ea"/>
+        <a:cs typeface="+mn-cs"/>
+      </a:defRPr>
+    </a:lvl4pPr>
+    <a:lvl5pPr marL="1828800" algn="l" defTabSz="914400" rtl="0" eaLnBrk="1" latinLnBrk="0" hangingPunct="1">
+      <a:defRPr sz="1200" kern="1200">
+        <a:solidFill>
+          <a:schemeClr val="tx1"/>
+        </a:solidFill>
+        <a:latin typeface="+mn-lt"/>
+        <a:ea typeface="+mn-ea"/>
+        <a:cs typeface="+mn-cs"/>
+      </a:defRPr>
+    </a:lvl5pPr>
+    <a:lvl6pPr marL="2286000" algn="l" defTabSz="914400" rtl="0" eaLnBrk="1" latinLnBrk="0" hangingPunct="1">
+      <a:defRPr sz="1200" kern="1200">
+        <a:solidFill>
+          <a:schemeClr val="tx1"/>
+        </a:solidFill>
+        <a:latin typeface="+mn-lt"/>
+        <a:ea typeface="+mn-ea"/>
+        <a:cs typeface="+mn-cs"/>
+      </a:defRPr>
+    </a:lvl6pPr>
+    <a:lvl7pPr marL="2743200" algn="l" defTabSz="914400" rtl="0" eaLnBrk="1" latinLnBrk="0" hangingPunct="1">
+      <a:defRPr sz="1200" kern="1200">
+        <a:solidFill>
+          <a:schemeClr val="tx1"/>
+        </a:solidFill>
+        <a:latin typeface="+mn-lt"/>
+        <a:ea typeface="+mn-ea"/>
+        <a:cs typeface="+mn-cs"/>
+      </a:defRPr>
+    </a:lvl7pPr>
+    <a:lvl8pPr marL="3200400" algn="l" defTabSz="914400" rtl="0" eaLnBrk="1" latinLnBrk="0" hangingPunct="1">
+      <a:defRPr sz="1200" kern="1200">
+        <a:solidFill>
+          <a:schemeClr val="tx1"/>
+        </a:solidFill>
+        <a:latin typeface="+mn-lt"/>
+        <a:ea typeface="+mn-ea"/>
+        <a:cs typeface="+mn-cs"/>
+      </a:defRPr>
+    </a:lvl8pPr>
+    <a:lvl9pPr marL="3657600" algn="l" defTabSz="914400" rtl="0" eaLnBrk="1" latinLnBrk="0" hangingPunct="1">
+      <a:defRPr sz="1200" kern="1200">
+        <a:solidFill>
+          <a:schemeClr val="tx1"/>
+        </a:solidFill>
+        <a:latin typeface="+mn-lt"/>
+        <a:ea typeface="+mn-ea"/>
+        <a:cs typeface="+mn-cs"/>
+      </a:defRPr>
+    </a:lvl9pPr>
+  </p:notesStyle>
+</p:notesMaster>
+</file>
+
+<file path=ppt/notesSlides/notesSlide1.xml><?xml version="1.0" encoding="utf-8"?>
+<p:notes xmlns:a="http://schemas.openxmlformats.org/drawingml/2006/main" xmlns:r="http://schemas.openxmlformats.org/officeDocument/2006/relationships" xmlns:p="http://schemas.openxmlformats.org/presentationml/2006/main">
+  <p:cSld>
+    <p:spTree>
+      <p:nvGrpSpPr>
+        <p:cNvPr id="1" name=""/>
+        <p:cNvGrpSpPr/>
+        <p:nvPr/>
+      </p:nvGrpSpPr>
+      <p:grpSpPr>
+        <a:xfrm>
+          <a:off x="0" y="0"/>
+          <a:ext cx="0" cy="0"/>
+          <a:chOff x="0" y="0"/>
+          <a:chExt cx="0" cy="0"/>
+        </a:xfrm>
+      </p:grpSpPr>
+      <p:sp>
+        <p:nvSpPr>
+          <p:cNvPr id="2" name="Slide Image Placeholder 1"/>
+          <p:cNvSpPr>
+            <a:spLocks noGrp="1" noRot="1" noChangeAspect="1"/>
+          </p:cNvSpPr>
+          <p:nvPr>
+            <p:ph type="sldImg"/>
+          </p:nvPr>
+        </p:nvSpPr>
+        <p:spPr/>
+      </p:sp>
+      <p:sp>
+        <p:nvSpPr>
+          <p:cNvPr id="3" name="Notes Placeholder 2"/>
+          <p:cNvSpPr>
+            <a:spLocks noGrp="1"/>
+          </p:cNvSpPr>
+          <p:nvPr>
+            <p:ph type="body" idx="1"/>
+          </p:nvPr>
+        </p:nvSpPr>
+        <p:spPr/>
+        <p:txBody>
+          <a:bodyPr/>
+          <a:lstStyle/>
+          <a:p>
+            <a:r>
+              <a:rPr lang="nl-NL" dirty="0" err="1" smtClean="0"/>
+              <a:t>Welcome</a:t>
+            </a:r>
+            <a:r>
+              <a:rPr lang="nl-NL" dirty="0" smtClean="0"/>
+              <a:t>,</a:t>
+            </a:r>
+          </a:p>
+          <a:p>
+            <a:endParaRPr lang="nl-NL" dirty="0" smtClean="0"/>
+          </a:p>
+          <a:p>
+            <a:r>
+              <a:rPr lang="nl-NL" dirty="0" err="1" smtClean="0"/>
+              <a:t>Here’s</a:t>
+            </a:r>
+            <a:r>
+              <a:rPr lang="nl-NL" baseline="0" dirty="0" smtClean="0"/>
+              <a:t> Jens, Louis, Paul, Chris </a:t>
+            </a:r>
+            <a:r>
+              <a:rPr lang="nl-NL" baseline="0" dirty="0" err="1" smtClean="0"/>
+              <a:t>and</a:t>
+            </a:r>
+            <a:r>
+              <a:rPr lang="nl-NL" baseline="0" dirty="0" smtClean="0"/>
+              <a:t> </a:t>
+            </a:r>
+            <a:r>
+              <a:rPr lang="nl-NL" baseline="0" dirty="0" err="1" smtClean="0"/>
+              <a:t>myself</a:t>
+            </a:r>
+            <a:r>
+              <a:rPr lang="nl-NL" baseline="0" dirty="0" smtClean="0"/>
+              <a:t> Boudewijn</a:t>
+            </a:r>
+          </a:p>
+          <a:p>
+            <a:endParaRPr lang="nl-NL" baseline="0" dirty="0" smtClean="0"/>
+          </a:p>
+          <a:p>
+            <a:r>
+              <a:rPr lang="nl-NL" dirty="0" smtClean="0"/>
+              <a:t>We</a:t>
+            </a:r>
+            <a:r>
+              <a:rPr lang="nl-NL" baseline="0" dirty="0" smtClean="0"/>
+              <a:t> </a:t>
+            </a:r>
+            <a:r>
+              <a:rPr lang="nl-NL" baseline="0" dirty="0" err="1" smtClean="0"/>
+              <a:t>will</a:t>
+            </a:r>
+            <a:r>
+              <a:rPr lang="nl-NL" baseline="0" dirty="0" smtClean="0"/>
+              <a:t> </a:t>
+            </a:r>
+            <a:r>
+              <a:rPr lang="nl-NL" baseline="0" dirty="0" err="1" smtClean="0"/>
+              <a:t>use</a:t>
+            </a:r>
+            <a:r>
+              <a:rPr lang="nl-NL" baseline="0" dirty="0" smtClean="0"/>
+              <a:t> the next 30 minutes </a:t>
+            </a:r>
+            <a:r>
+              <a:rPr lang="nl-NL" baseline="0" dirty="0" err="1" smtClean="0"/>
+              <a:t>to</a:t>
+            </a:r>
+            <a:r>
+              <a:rPr lang="nl-NL" baseline="0" dirty="0" smtClean="0"/>
+              <a:t> present </a:t>
+            </a:r>
+            <a:r>
+              <a:rPr lang="nl-NL" baseline="0" dirty="0" err="1" smtClean="0"/>
+              <a:t>our</a:t>
+            </a:r>
+            <a:r>
+              <a:rPr lang="nl-NL" baseline="0" dirty="0" smtClean="0"/>
+              <a:t> product.</a:t>
+            </a:r>
+            <a:endParaRPr lang="nl-NL" dirty="0"/>
+          </a:p>
+        </p:txBody>
+      </p:sp>
+      <p:sp>
+        <p:nvSpPr>
+          <p:cNvPr id="4" name="Slide Number Placeholder 3"/>
+          <p:cNvSpPr>
+            <a:spLocks noGrp="1"/>
+          </p:cNvSpPr>
+          <p:nvPr>
+            <p:ph type="sldNum" sz="quarter" idx="10"/>
+          </p:nvPr>
+        </p:nvSpPr>
+        <p:spPr/>
+        <p:txBody>
+          <a:bodyPr/>
+          <a:lstStyle/>
+          <a:p>
+            <a:fld id="{2EDF4D38-89ED-4567-AF2A-BD465BA01217}" type="slidenum">
+              <a:rPr lang="nl-NL" smtClean="0"/>
+              <a:t>1</a:t>
+            </a:fld>
+            <a:endParaRPr lang="nl-NL"/>
+          </a:p>
+        </p:txBody>
+      </p:sp>
+    </p:spTree>
+    <p:extLst>
+      <p:ext uri="{BB962C8B-B14F-4D97-AF65-F5344CB8AC3E}">
+        <p14:creationId xmlns:p14="http://schemas.microsoft.com/office/powerpoint/2010/main" val="488269781"/>
+      </p:ext>
+    </p:extLst>
+  </p:cSld>
+  <p:clrMapOvr>
+    <a:masterClrMapping/>
+  </p:clrMapOvr>
+</p:notes>
+</file>
+
+<file path=ppt/notesSlides/notesSlide10.xml><?xml version="1.0" encoding="utf-8"?>
+<p:notes xmlns:a="http://schemas.openxmlformats.org/drawingml/2006/main" xmlns:r="http://schemas.openxmlformats.org/officeDocument/2006/relationships" xmlns:p="http://schemas.openxmlformats.org/presentationml/2006/main">
+  <p:cSld>
+    <p:spTree>
+      <p:nvGrpSpPr>
+        <p:cNvPr id="1" name=""/>
+        <p:cNvGrpSpPr/>
+        <p:nvPr/>
+      </p:nvGrpSpPr>
+      <p:grpSpPr>
+        <a:xfrm>
+          <a:off x="0" y="0"/>
+          <a:ext cx="0" cy="0"/>
+          <a:chOff x="0" y="0"/>
+          <a:chExt cx="0" cy="0"/>
+        </a:xfrm>
+      </p:grpSpPr>
+      <p:sp>
+        <p:nvSpPr>
+          <p:cNvPr id="2" name="Slide Image Placeholder 1"/>
+          <p:cNvSpPr>
+            <a:spLocks noGrp="1" noRot="1" noChangeAspect="1"/>
+          </p:cNvSpPr>
+          <p:nvPr>
+            <p:ph type="sldImg"/>
+          </p:nvPr>
+        </p:nvSpPr>
+        <p:spPr/>
+      </p:sp>
+      <p:sp>
+        <p:nvSpPr>
+          <p:cNvPr id="3" name="Notes Placeholder 2"/>
+          <p:cNvSpPr>
+            <a:spLocks noGrp="1"/>
+          </p:cNvSpPr>
+          <p:nvPr>
+            <p:ph type="body" idx="1"/>
+          </p:nvPr>
+        </p:nvSpPr>
+        <p:spPr/>
+        <p:txBody>
+          <a:bodyPr/>
+          <a:lstStyle/>
+          <a:p>
+            <a:r>
+              <a:rPr lang="nl-NL" dirty="0" smtClean="0"/>
+              <a:t>Spreekt voor zichzelf</a:t>
+            </a:r>
+            <a:endParaRPr lang="nl-NL" dirty="0"/>
+          </a:p>
+        </p:txBody>
+      </p:sp>
+      <p:sp>
+        <p:nvSpPr>
+          <p:cNvPr id="4" name="Slide Number Placeholder 3"/>
+          <p:cNvSpPr>
+            <a:spLocks noGrp="1"/>
+          </p:cNvSpPr>
+          <p:nvPr>
+            <p:ph type="sldNum" sz="quarter" idx="10"/>
+          </p:nvPr>
+        </p:nvSpPr>
+        <p:spPr/>
+        <p:txBody>
+          <a:bodyPr/>
+          <a:lstStyle/>
+          <a:p>
+            <a:fld id="{2EDF4D38-89ED-4567-AF2A-BD465BA01217}" type="slidenum">
+              <a:rPr lang="nl-NL" smtClean="0"/>
+              <a:t>10</a:t>
+            </a:fld>
+            <a:endParaRPr lang="nl-NL"/>
+          </a:p>
+        </p:txBody>
+      </p:sp>
+    </p:spTree>
+    <p:extLst>
+      <p:ext uri="{BB962C8B-B14F-4D97-AF65-F5344CB8AC3E}">
+        <p14:creationId xmlns:p14="http://schemas.microsoft.com/office/powerpoint/2010/main" val="4251447943"/>
+      </p:ext>
+    </p:extLst>
+  </p:cSld>
+  <p:clrMapOvr>
+    <a:masterClrMapping/>
+  </p:clrMapOvr>
+</p:notes>
+</file>
+
+<file path=ppt/notesSlides/notesSlide11.xml><?xml version="1.0" encoding="utf-8"?>
+<p:notes xmlns:a="http://schemas.openxmlformats.org/drawingml/2006/main" xmlns:r="http://schemas.openxmlformats.org/officeDocument/2006/relationships" xmlns:p="http://schemas.openxmlformats.org/presentationml/2006/main">
+  <p:cSld>
+    <p:spTree>
+      <p:nvGrpSpPr>
+        <p:cNvPr id="1" name=""/>
+        <p:cNvGrpSpPr/>
+        <p:nvPr/>
+      </p:nvGrpSpPr>
+      <p:grpSpPr>
+        <a:xfrm>
+          <a:off x="0" y="0"/>
+          <a:ext cx="0" cy="0"/>
+          <a:chOff x="0" y="0"/>
+          <a:chExt cx="0" cy="0"/>
+        </a:xfrm>
+      </p:grpSpPr>
+      <p:sp>
+        <p:nvSpPr>
+          <p:cNvPr id="2" name="Slide Image Placeholder 1"/>
+          <p:cNvSpPr>
+            <a:spLocks noGrp="1" noRot="1" noChangeAspect="1"/>
+          </p:cNvSpPr>
+          <p:nvPr>
+            <p:ph type="sldImg"/>
+          </p:nvPr>
+        </p:nvSpPr>
+        <p:spPr/>
+      </p:sp>
+      <p:sp>
+        <p:nvSpPr>
+          <p:cNvPr id="3" name="Notes Placeholder 2"/>
+          <p:cNvSpPr>
+            <a:spLocks noGrp="1"/>
+          </p:cNvSpPr>
+          <p:nvPr>
+            <p:ph type="body" idx="1"/>
+          </p:nvPr>
+        </p:nvSpPr>
+        <p:spPr/>
+        <p:txBody>
+          <a:bodyPr/>
+          <a:lstStyle/>
+          <a:p>
+            <a:r>
+              <a:rPr lang="nl-NL" dirty="0" smtClean="0"/>
+              <a:t>Excel </a:t>
+            </a:r>
+            <a:r>
+              <a:rPr lang="nl-NL" dirty="0" err="1" smtClean="0"/>
+              <a:t>comma</a:t>
+            </a:r>
+            <a:r>
+              <a:rPr lang="nl-NL" dirty="0" smtClean="0"/>
+              <a:t> -&gt; semicolon</a:t>
+            </a:r>
+          </a:p>
+          <a:p>
+            <a:r>
+              <a:rPr lang="nl-NL" dirty="0" smtClean="0"/>
+              <a:t>Mor</a:t>
+            </a:r>
+            <a:r>
+              <a:rPr lang="nl-NL" baseline="0" dirty="0" smtClean="0"/>
+              <a:t>e </a:t>
+            </a:r>
+            <a:r>
+              <a:rPr lang="nl-NL" baseline="0" dirty="0" err="1" smtClean="0"/>
+              <a:t>visualizations</a:t>
+            </a:r>
+            <a:endParaRPr lang="nl-NL" baseline="0" dirty="0" smtClean="0"/>
+          </a:p>
+          <a:p>
+            <a:r>
+              <a:rPr lang="nl-NL" baseline="0" dirty="0" err="1" smtClean="0"/>
+              <a:t>Improvements</a:t>
+            </a:r>
+            <a:r>
+              <a:rPr lang="nl-NL" baseline="0" dirty="0" smtClean="0"/>
+              <a:t> </a:t>
+            </a:r>
+            <a:r>
+              <a:rPr lang="nl-NL" baseline="0" dirty="0" err="1" smtClean="0"/>
+              <a:t>to</a:t>
+            </a:r>
+            <a:r>
+              <a:rPr lang="nl-NL" baseline="0" dirty="0" smtClean="0"/>
+              <a:t> GUI </a:t>
+            </a:r>
+            <a:r>
+              <a:rPr lang="nl-NL" baseline="0" dirty="0" err="1" smtClean="0"/>
+              <a:t>to</a:t>
+            </a:r>
+            <a:r>
+              <a:rPr lang="nl-NL" baseline="0" dirty="0" smtClean="0"/>
+              <a:t> </a:t>
+            </a:r>
+            <a:r>
+              <a:rPr lang="nl-NL" baseline="0" dirty="0" err="1" smtClean="0"/>
+              <a:t>enhance</a:t>
+            </a:r>
+            <a:r>
+              <a:rPr lang="nl-NL" baseline="0" dirty="0" smtClean="0"/>
+              <a:t> </a:t>
+            </a:r>
+            <a:r>
+              <a:rPr lang="nl-NL" baseline="0" dirty="0" err="1" smtClean="0"/>
+              <a:t>usability</a:t>
+            </a:r>
+            <a:r>
+              <a:rPr lang="nl-NL" baseline="0" dirty="0" smtClean="0"/>
+              <a:t>.</a:t>
+            </a:r>
+            <a:endParaRPr lang="nl-NL" dirty="0"/>
+          </a:p>
+        </p:txBody>
+      </p:sp>
+      <p:sp>
+        <p:nvSpPr>
+          <p:cNvPr id="4" name="Slide Number Placeholder 3"/>
+          <p:cNvSpPr>
+            <a:spLocks noGrp="1"/>
+          </p:cNvSpPr>
+          <p:nvPr>
+            <p:ph type="sldNum" sz="quarter" idx="10"/>
+          </p:nvPr>
+        </p:nvSpPr>
+        <p:spPr/>
+        <p:txBody>
+          <a:bodyPr/>
+          <a:lstStyle/>
+          <a:p>
+            <a:fld id="{2EDF4D38-89ED-4567-AF2A-BD465BA01217}" type="slidenum">
+              <a:rPr lang="nl-NL" smtClean="0"/>
+              <a:t>11</a:t>
+            </a:fld>
+            <a:endParaRPr lang="nl-NL"/>
+          </a:p>
+        </p:txBody>
+      </p:sp>
+    </p:spTree>
+    <p:extLst>
+      <p:ext uri="{BB962C8B-B14F-4D97-AF65-F5344CB8AC3E}">
+        <p14:creationId xmlns:p14="http://schemas.microsoft.com/office/powerpoint/2010/main" val="1616283511"/>
+      </p:ext>
+    </p:extLst>
+  </p:cSld>
+  <p:clrMapOvr>
+    <a:masterClrMapping/>
+  </p:clrMapOvr>
+</p:notes>
+</file>
+
+<file path=ppt/notesSlides/notesSlide12.xml><?xml version="1.0" encoding="utf-8"?>
+<p:notes xmlns:a="http://schemas.openxmlformats.org/drawingml/2006/main" xmlns:r="http://schemas.openxmlformats.org/officeDocument/2006/relationships" xmlns:p="http://schemas.openxmlformats.org/presentationml/2006/main">
+  <p:cSld>
+    <p:spTree>
+      <p:nvGrpSpPr>
+        <p:cNvPr id="1" name=""/>
+        <p:cNvGrpSpPr/>
+        <p:nvPr/>
+      </p:nvGrpSpPr>
+      <p:grpSpPr>
+        <a:xfrm>
+          <a:off x="0" y="0"/>
+          <a:ext cx="0" cy="0"/>
+          <a:chOff x="0" y="0"/>
+          <a:chExt cx="0" cy="0"/>
+        </a:xfrm>
+      </p:grpSpPr>
+      <p:sp>
+        <p:nvSpPr>
+          <p:cNvPr id="2" name="Slide Image Placeholder 1"/>
+          <p:cNvSpPr>
+            <a:spLocks noGrp="1" noRot="1" noChangeAspect="1"/>
+          </p:cNvSpPr>
+          <p:nvPr>
+            <p:ph type="sldImg"/>
+          </p:nvPr>
+        </p:nvSpPr>
+        <p:spPr/>
+      </p:sp>
+      <p:sp>
+        <p:nvSpPr>
+          <p:cNvPr id="3" name="Notes Placeholder 2"/>
+          <p:cNvSpPr>
+            <a:spLocks noGrp="1"/>
+          </p:cNvSpPr>
+          <p:nvPr>
+            <p:ph type="body" idx="1"/>
+          </p:nvPr>
+        </p:nvSpPr>
+        <p:spPr/>
+        <p:txBody>
+          <a:bodyPr/>
+          <a:lstStyle/>
+          <a:p>
+            <a:r>
+              <a:rPr lang="nl-NL" dirty="0" smtClean="0"/>
+              <a:t>In part 2 </a:t>
+            </a:r>
+            <a:r>
+              <a:rPr lang="nl-NL" dirty="0" err="1" smtClean="0"/>
+              <a:t>will</a:t>
+            </a:r>
+            <a:r>
+              <a:rPr lang="nl-NL" dirty="0" smtClean="0"/>
+              <a:t> go </a:t>
+            </a:r>
+            <a:r>
+              <a:rPr lang="nl-NL" dirty="0" err="1" smtClean="0"/>
+              <a:t>into</a:t>
+            </a:r>
+            <a:r>
+              <a:rPr lang="nl-NL" dirty="0" smtClean="0"/>
+              <a:t> </a:t>
+            </a:r>
+            <a:r>
+              <a:rPr lang="nl-NL" dirty="0" err="1" smtClean="0"/>
+              <a:t>some</a:t>
+            </a:r>
+            <a:r>
+              <a:rPr lang="nl-NL" dirty="0" smtClean="0"/>
+              <a:t> more </a:t>
+            </a:r>
+            <a:r>
+              <a:rPr lang="nl-NL" dirty="0" err="1" smtClean="0"/>
+              <a:t>depth</a:t>
+            </a:r>
+            <a:r>
+              <a:rPr lang="nl-NL" dirty="0" smtClean="0"/>
+              <a:t> </a:t>
+            </a:r>
+            <a:r>
+              <a:rPr lang="nl-NL" dirty="0" err="1" smtClean="0"/>
+              <a:t>regarding</a:t>
+            </a:r>
+            <a:r>
+              <a:rPr lang="nl-NL" dirty="0" smtClean="0"/>
+              <a:t> the</a:t>
+            </a:r>
+            <a:r>
+              <a:rPr lang="nl-NL" baseline="0" dirty="0" smtClean="0"/>
+              <a:t> software engineering side of </a:t>
+            </a:r>
+            <a:r>
+              <a:rPr lang="nl-NL" baseline="0" dirty="0" err="1" smtClean="0"/>
+              <a:t>our</a:t>
+            </a:r>
+            <a:r>
+              <a:rPr lang="nl-NL" baseline="0" dirty="0" smtClean="0"/>
+              <a:t> product.</a:t>
+            </a:r>
+            <a:endParaRPr lang="nl-NL" dirty="0"/>
+          </a:p>
+        </p:txBody>
+      </p:sp>
+      <p:sp>
+        <p:nvSpPr>
+          <p:cNvPr id="4" name="Slide Number Placeholder 3"/>
+          <p:cNvSpPr>
+            <a:spLocks noGrp="1"/>
+          </p:cNvSpPr>
+          <p:nvPr>
+            <p:ph type="sldNum" sz="quarter" idx="10"/>
+          </p:nvPr>
+        </p:nvSpPr>
+        <p:spPr/>
+        <p:txBody>
+          <a:bodyPr/>
+          <a:lstStyle/>
+          <a:p>
+            <a:fld id="{2EDF4D38-89ED-4567-AF2A-BD465BA01217}" type="slidenum">
+              <a:rPr lang="nl-NL" smtClean="0"/>
+              <a:t>15</a:t>
+            </a:fld>
+            <a:endParaRPr lang="nl-NL"/>
+          </a:p>
+        </p:txBody>
+      </p:sp>
+    </p:spTree>
+    <p:extLst>
+      <p:ext uri="{BB962C8B-B14F-4D97-AF65-F5344CB8AC3E}">
+        <p14:creationId xmlns:p14="http://schemas.microsoft.com/office/powerpoint/2010/main" val="1731127048"/>
+      </p:ext>
+    </p:extLst>
+  </p:cSld>
+  <p:clrMapOvr>
+    <a:masterClrMapping/>
+  </p:clrMapOvr>
+</p:notes>
+</file>
+
+<file path=ppt/notesSlides/notesSlide13.xml><?xml version="1.0" encoding="utf-8"?>
+<p:notes xmlns:a="http://schemas.openxmlformats.org/drawingml/2006/main" xmlns:r="http://schemas.openxmlformats.org/officeDocument/2006/relationships" xmlns:p="http://schemas.openxmlformats.org/presentationml/2006/main">
+  <p:cSld>
+    <p:spTree>
+      <p:nvGrpSpPr>
+        <p:cNvPr id="1" name=""/>
+        <p:cNvGrpSpPr/>
+        <p:nvPr/>
+      </p:nvGrpSpPr>
+      <p:grpSpPr>
+        <a:xfrm>
+          <a:off x="0" y="0"/>
+          <a:ext cx="0" cy="0"/>
+          <a:chOff x="0" y="0"/>
+          <a:chExt cx="0" cy="0"/>
+        </a:xfrm>
+      </p:grpSpPr>
+      <p:sp>
+        <p:nvSpPr>
+          <p:cNvPr id="2" name="Slide Image Placeholder 1"/>
+          <p:cNvSpPr>
+            <a:spLocks noGrp="1" noRot="1" noChangeAspect="1"/>
+          </p:cNvSpPr>
+          <p:nvPr>
+            <p:ph type="sldImg"/>
+          </p:nvPr>
+        </p:nvSpPr>
+        <p:spPr/>
+      </p:sp>
+      <p:sp>
+        <p:nvSpPr>
+          <p:cNvPr id="3" name="Notes Placeholder 2"/>
+          <p:cNvSpPr>
+            <a:spLocks noGrp="1"/>
+          </p:cNvSpPr>
+          <p:nvPr>
+            <p:ph type="body" idx="1"/>
+          </p:nvPr>
+        </p:nvSpPr>
+        <p:spPr/>
+        <p:txBody>
+          <a:bodyPr/>
+          <a:lstStyle/>
+          <a:p>
+            <a:r>
+              <a:rPr lang="nl-NL" dirty="0" smtClean="0"/>
+              <a:t>Slide uitleggen</a:t>
+            </a:r>
+            <a:endParaRPr lang="nl-NL" dirty="0"/>
+          </a:p>
+        </p:txBody>
+      </p:sp>
+      <p:sp>
+        <p:nvSpPr>
+          <p:cNvPr id="4" name="Slide Number Placeholder 3"/>
+          <p:cNvSpPr>
+            <a:spLocks noGrp="1"/>
+          </p:cNvSpPr>
+          <p:nvPr>
+            <p:ph type="sldNum" sz="quarter" idx="10"/>
+          </p:nvPr>
+        </p:nvSpPr>
+        <p:spPr/>
+        <p:txBody>
+          <a:bodyPr/>
+          <a:lstStyle/>
+          <a:p>
+            <a:fld id="{2EDF4D38-89ED-4567-AF2A-BD465BA01217}" type="slidenum">
+              <a:rPr lang="nl-NL" smtClean="0"/>
+              <a:t>16</a:t>
+            </a:fld>
+            <a:endParaRPr lang="nl-NL"/>
+          </a:p>
+        </p:txBody>
+      </p:sp>
+    </p:spTree>
+    <p:extLst>
+      <p:ext uri="{BB962C8B-B14F-4D97-AF65-F5344CB8AC3E}">
+        <p14:creationId xmlns:p14="http://schemas.microsoft.com/office/powerpoint/2010/main" val="3283301168"/>
+      </p:ext>
+    </p:extLst>
+  </p:cSld>
+  <p:clrMapOvr>
+    <a:masterClrMapping/>
+  </p:clrMapOvr>
+</p:notes>
+</file>
+
+<file path=ppt/notesSlides/notesSlide14.xml><?xml version="1.0" encoding="utf-8"?>
+<p:notes xmlns:a="http://schemas.openxmlformats.org/drawingml/2006/main" xmlns:r="http://schemas.openxmlformats.org/officeDocument/2006/relationships" xmlns:p="http://schemas.openxmlformats.org/presentationml/2006/main">
+  <p:cSld>
+    <p:spTree>
+      <p:nvGrpSpPr>
+        <p:cNvPr id="1" name=""/>
+        <p:cNvGrpSpPr/>
+        <p:nvPr/>
+      </p:nvGrpSpPr>
+      <p:grpSpPr>
+        <a:xfrm>
+          <a:off x="0" y="0"/>
+          <a:ext cx="0" cy="0"/>
+          <a:chOff x="0" y="0"/>
+          <a:chExt cx="0" cy="0"/>
+        </a:xfrm>
+      </p:grpSpPr>
+      <p:sp>
+        <p:nvSpPr>
+          <p:cNvPr id="2" name="Slide Image Placeholder 1"/>
+          <p:cNvSpPr>
+            <a:spLocks noGrp="1" noRot="1" noChangeAspect="1"/>
+          </p:cNvSpPr>
+          <p:nvPr>
+            <p:ph type="sldImg"/>
+          </p:nvPr>
+        </p:nvSpPr>
+        <p:spPr/>
+      </p:sp>
+      <p:sp>
+        <p:nvSpPr>
+          <p:cNvPr id="3" name="Notes Placeholder 2"/>
+          <p:cNvSpPr>
+            <a:spLocks noGrp="1"/>
+          </p:cNvSpPr>
+          <p:nvPr>
+            <p:ph type="body" idx="1"/>
+          </p:nvPr>
+        </p:nvSpPr>
+        <p:spPr/>
+        <p:txBody>
+          <a:bodyPr/>
+          <a:lstStyle/>
+          <a:p>
+            <a:r>
+              <a:rPr lang="nl-NL" dirty="0" smtClean="0"/>
+              <a:t>Slide uitleggen</a:t>
+            </a:r>
+            <a:endParaRPr lang="nl-NL" dirty="0"/>
+          </a:p>
+        </p:txBody>
+      </p:sp>
+      <p:sp>
+        <p:nvSpPr>
+          <p:cNvPr id="4" name="Slide Number Placeholder 3"/>
+          <p:cNvSpPr>
+            <a:spLocks noGrp="1"/>
+          </p:cNvSpPr>
+          <p:nvPr>
+            <p:ph type="sldNum" sz="quarter" idx="10"/>
+          </p:nvPr>
+        </p:nvSpPr>
+        <p:spPr/>
+        <p:txBody>
+          <a:bodyPr/>
+          <a:lstStyle/>
+          <a:p>
+            <a:fld id="{2EDF4D38-89ED-4567-AF2A-BD465BA01217}" type="slidenum">
+              <a:rPr lang="nl-NL" smtClean="0"/>
+              <a:t>17</a:t>
+            </a:fld>
+            <a:endParaRPr lang="nl-NL"/>
+          </a:p>
+        </p:txBody>
+      </p:sp>
+    </p:spTree>
+    <p:extLst>
+      <p:ext uri="{BB962C8B-B14F-4D97-AF65-F5344CB8AC3E}">
+        <p14:creationId xmlns:p14="http://schemas.microsoft.com/office/powerpoint/2010/main" val="3058547808"/>
+      </p:ext>
+    </p:extLst>
+  </p:cSld>
+  <p:clrMapOvr>
+    <a:masterClrMapping/>
+  </p:clrMapOvr>
+</p:notes>
+</file>
+
+<file path=ppt/notesSlides/notesSlide15.xml><?xml version="1.0" encoding="utf-8"?>
+<p:notes xmlns:a="http://schemas.openxmlformats.org/drawingml/2006/main" xmlns:r="http://schemas.openxmlformats.org/officeDocument/2006/relationships" xmlns:p="http://schemas.openxmlformats.org/presentationml/2006/main">
+  <p:cSld>
+    <p:spTree>
+      <p:nvGrpSpPr>
+        <p:cNvPr id="1" name=""/>
+        <p:cNvGrpSpPr/>
+        <p:nvPr/>
+      </p:nvGrpSpPr>
+      <p:grpSpPr>
+        <a:xfrm>
+          <a:off x="0" y="0"/>
+          <a:ext cx="0" cy="0"/>
+          <a:chOff x="0" y="0"/>
+          <a:chExt cx="0" cy="0"/>
+        </a:xfrm>
+      </p:grpSpPr>
+      <p:sp>
+        <p:nvSpPr>
+          <p:cNvPr id="2" name="Slide Image Placeholder 1"/>
+          <p:cNvSpPr>
+            <a:spLocks noGrp="1" noRot="1" noChangeAspect="1"/>
+          </p:cNvSpPr>
+          <p:nvPr>
+            <p:ph type="sldImg"/>
+          </p:nvPr>
+        </p:nvSpPr>
+        <p:spPr/>
+      </p:sp>
+      <p:sp>
+        <p:nvSpPr>
+          <p:cNvPr id="3" name="Notes Placeholder 2"/>
+          <p:cNvSpPr>
+            <a:spLocks noGrp="1"/>
+          </p:cNvSpPr>
+          <p:nvPr>
+            <p:ph type="body" idx="1"/>
+          </p:nvPr>
+        </p:nvSpPr>
+        <p:spPr/>
+        <p:txBody>
+          <a:bodyPr/>
+          <a:lstStyle/>
+          <a:p>
+            <a:r>
+              <a:rPr lang="nl-NL" dirty="0" smtClean="0"/>
+              <a:t>Slide uitleggen</a:t>
+            </a:r>
+            <a:endParaRPr lang="nl-NL" dirty="0"/>
+          </a:p>
+        </p:txBody>
+      </p:sp>
+      <p:sp>
+        <p:nvSpPr>
+          <p:cNvPr id="4" name="Slide Number Placeholder 3"/>
+          <p:cNvSpPr>
+            <a:spLocks noGrp="1"/>
+          </p:cNvSpPr>
+          <p:nvPr>
+            <p:ph type="sldNum" sz="quarter" idx="10"/>
+          </p:nvPr>
+        </p:nvSpPr>
+        <p:spPr/>
+        <p:txBody>
+          <a:bodyPr/>
+          <a:lstStyle/>
+          <a:p>
+            <a:fld id="{2EDF4D38-89ED-4567-AF2A-BD465BA01217}" type="slidenum">
+              <a:rPr lang="nl-NL" smtClean="0"/>
+              <a:t>18</a:t>
+            </a:fld>
+            <a:endParaRPr lang="nl-NL"/>
+          </a:p>
+        </p:txBody>
+      </p:sp>
+    </p:spTree>
+    <p:extLst>
+      <p:ext uri="{BB962C8B-B14F-4D97-AF65-F5344CB8AC3E}">
+        <p14:creationId xmlns:p14="http://schemas.microsoft.com/office/powerpoint/2010/main" val="119988069"/>
+      </p:ext>
+    </p:extLst>
+  </p:cSld>
+  <p:clrMapOvr>
+    <a:masterClrMapping/>
+  </p:clrMapOvr>
+</p:notes>
+</file>
+
+<file path=ppt/notesSlides/notesSlide16.xml><?xml version="1.0" encoding="utf-8"?>
+<p:notes xmlns:a="http://schemas.openxmlformats.org/drawingml/2006/main" xmlns:r="http://schemas.openxmlformats.org/officeDocument/2006/relationships" xmlns:p="http://schemas.openxmlformats.org/presentationml/2006/main">
+  <p:cSld>
+    <p:spTree>
+      <p:nvGrpSpPr>
+        <p:cNvPr id="1" name=""/>
+        <p:cNvGrpSpPr/>
+        <p:nvPr/>
+      </p:nvGrpSpPr>
+      <p:grpSpPr>
+        <a:xfrm>
+          <a:off x="0" y="0"/>
+          <a:ext cx="0" cy="0"/>
+          <a:chOff x="0" y="0"/>
+          <a:chExt cx="0" cy="0"/>
+        </a:xfrm>
+      </p:grpSpPr>
+      <p:sp>
+        <p:nvSpPr>
+          <p:cNvPr id="2" name="Slide Image Placeholder 1"/>
+          <p:cNvSpPr>
+            <a:spLocks noGrp="1" noRot="1" noChangeAspect="1"/>
+          </p:cNvSpPr>
+          <p:nvPr>
+            <p:ph type="sldImg"/>
+          </p:nvPr>
+        </p:nvSpPr>
+        <p:spPr/>
+      </p:sp>
+      <p:sp>
+        <p:nvSpPr>
+          <p:cNvPr id="3" name="Notes Placeholder 2"/>
+          <p:cNvSpPr>
+            <a:spLocks noGrp="1"/>
+          </p:cNvSpPr>
+          <p:nvPr>
+            <p:ph type="body" idx="1"/>
+          </p:nvPr>
+        </p:nvSpPr>
+        <p:spPr/>
+        <p:txBody>
+          <a:bodyPr/>
+          <a:lstStyle/>
+          <a:p>
+            <a:endParaRPr lang="nl-NL"/>
+          </a:p>
+        </p:txBody>
+      </p:sp>
+      <p:sp>
+        <p:nvSpPr>
+          <p:cNvPr id="4" name="Slide Number Placeholder 3"/>
+          <p:cNvSpPr>
+            <a:spLocks noGrp="1"/>
+          </p:cNvSpPr>
+          <p:nvPr>
+            <p:ph type="sldNum" sz="quarter" idx="10"/>
+          </p:nvPr>
+        </p:nvSpPr>
+        <p:spPr/>
+        <p:txBody>
+          <a:bodyPr/>
+          <a:lstStyle/>
+          <a:p>
+            <a:fld id="{2EDF4D38-89ED-4567-AF2A-BD465BA01217}" type="slidenum">
+              <a:rPr lang="nl-NL" smtClean="0"/>
+              <a:t>19</a:t>
+            </a:fld>
+            <a:endParaRPr lang="nl-NL"/>
+          </a:p>
+        </p:txBody>
+      </p:sp>
+    </p:spTree>
+    <p:extLst>
+      <p:ext uri="{BB962C8B-B14F-4D97-AF65-F5344CB8AC3E}">
+        <p14:creationId xmlns:p14="http://schemas.microsoft.com/office/powerpoint/2010/main" val="1667937073"/>
+      </p:ext>
+    </p:extLst>
+  </p:cSld>
+  <p:clrMapOvr>
+    <a:masterClrMapping/>
+  </p:clrMapOvr>
+</p:notes>
+</file>
+
+<file path=ppt/notesSlides/notesSlide2.xml><?xml version="1.0" encoding="utf-8"?>
+<p:notes xmlns:a="http://schemas.openxmlformats.org/drawingml/2006/main" xmlns:r="http://schemas.openxmlformats.org/officeDocument/2006/relationships" xmlns:p="http://schemas.openxmlformats.org/presentationml/2006/main">
+  <p:cSld>
+    <p:spTree>
+      <p:nvGrpSpPr>
+        <p:cNvPr id="1" name=""/>
+        <p:cNvGrpSpPr/>
+        <p:nvPr/>
+      </p:nvGrpSpPr>
+      <p:grpSpPr>
+        <a:xfrm>
+          <a:off x="0" y="0"/>
+          <a:ext cx="0" cy="0"/>
+          <a:chOff x="0" y="0"/>
+          <a:chExt cx="0" cy="0"/>
+        </a:xfrm>
+      </p:grpSpPr>
+      <p:sp>
+        <p:nvSpPr>
+          <p:cNvPr id="2" name="Slide Image Placeholder 1"/>
+          <p:cNvSpPr>
+            <a:spLocks noGrp="1" noRot="1" noChangeAspect="1"/>
+          </p:cNvSpPr>
+          <p:nvPr>
+            <p:ph type="sldImg"/>
+          </p:nvPr>
+        </p:nvSpPr>
+        <p:spPr/>
+      </p:sp>
+      <p:sp>
+        <p:nvSpPr>
+          <p:cNvPr id="3" name="Notes Placeholder 2"/>
+          <p:cNvSpPr>
+            <a:spLocks noGrp="1"/>
+          </p:cNvSpPr>
+          <p:nvPr>
+            <p:ph type="body" idx="1"/>
+          </p:nvPr>
+        </p:nvSpPr>
+        <p:spPr/>
+        <p:txBody>
+          <a:bodyPr/>
+          <a:lstStyle/>
+          <a:p>
+            <a:r>
+              <a:rPr lang="nl-NL" baseline="0" dirty="0" smtClean="0"/>
+              <a:t>Walk </a:t>
+            </a:r>
+            <a:r>
+              <a:rPr lang="nl-NL" baseline="0" dirty="0" err="1" smtClean="0"/>
+              <a:t>through</a:t>
+            </a:r>
+            <a:r>
+              <a:rPr lang="nl-NL" baseline="0" dirty="0" smtClean="0"/>
+              <a:t>:</a:t>
+            </a:r>
+          </a:p>
+          <a:p>
+            <a:r>
+              <a:rPr lang="nl-NL" baseline="0" dirty="0" smtClean="0"/>
+              <a:t>	Background</a:t>
+            </a:r>
+          </a:p>
+          <a:p>
+            <a:r>
+              <a:rPr lang="nl-NL" baseline="0" dirty="0" smtClean="0"/>
+              <a:t>	The </a:t>
+            </a:r>
+            <a:r>
+              <a:rPr lang="nl-NL" baseline="0" dirty="0" err="1" smtClean="0"/>
+              <a:t>precise</a:t>
+            </a:r>
+            <a:r>
+              <a:rPr lang="nl-NL" baseline="0" dirty="0" smtClean="0"/>
+              <a:t> </a:t>
+            </a:r>
+            <a:r>
+              <a:rPr lang="nl-NL" baseline="0" dirty="0" err="1" smtClean="0"/>
+              <a:t>task</a:t>
+            </a:r>
+            <a:r>
+              <a:rPr lang="nl-NL" baseline="0" dirty="0" smtClean="0"/>
+              <a:t> we </a:t>
+            </a:r>
+            <a:r>
+              <a:rPr lang="nl-NL" baseline="0" dirty="0" err="1" smtClean="0"/>
+              <a:t>were</a:t>
+            </a:r>
+            <a:r>
+              <a:rPr lang="nl-NL" baseline="0" dirty="0" smtClean="0"/>
+              <a:t> </a:t>
+            </a:r>
+            <a:r>
+              <a:rPr lang="nl-NL" baseline="0" dirty="0" err="1" smtClean="0"/>
+              <a:t>given</a:t>
+            </a:r>
+            <a:endParaRPr lang="nl-NL" baseline="0" dirty="0" smtClean="0"/>
+          </a:p>
+          <a:p>
+            <a:r>
+              <a:rPr lang="nl-NL" baseline="0" dirty="0" smtClean="0"/>
+              <a:t>	</a:t>
+            </a:r>
+            <a:r>
+              <a:rPr lang="nl-NL" baseline="0" dirty="0" err="1" smtClean="0"/>
+              <a:t>What</a:t>
+            </a:r>
+            <a:r>
+              <a:rPr lang="nl-NL" baseline="0" dirty="0" smtClean="0"/>
+              <a:t> we </a:t>
+            </a:r>
+            <a:r>
+              <a:rPr lang="nl-NL" baseline="0" dirty="0" err="1" smtClean="0"/>
+              <a:t>actually</a:t>
+            </a:r>
+            <a:r>
+              <a:rPr lang="nl-NL" baseline="0" dirty="0" smtClean="0"/>
+              <a:t> </a:t>
+            </a:r>
+            <a:r>
+              <a:rPr lang="nl-NL" baseline="0" dirty="0" err="1" smtClean="0"/>
+              <a:t>produced</a:t>
+            </a:r>
+            <a:endParaRPr lang="nl-NL" baseline="0" dirty="0" smtClean="0"/>
+          </a:p>
+          <a:p>
+            <a:r>
+              <a:rPr lang="nl-NL" baseline="0" dirty="0" smtClean="0"/>
+              <a:t>	</a:t>
+            </a:r>
+            <a:r>
+              <a:rPr lang="nl-NL" baseline="0" dirty="0" err="1" smtClean="0"/>
+              <a:t>What</a:t>
+            </a:r>
+            <a:r>
+              <a:rPr lang="nl-NL" baseline="0" dirty="0" smtClean="0"/>
+              <a:t> </a:t>
+            </a:r>
+            <a:r>
+              <a:rPr lang="nl-NL" baseline="0" dirty="0" err="1" smtClean="0"/>
+              <a:t>we’d</a:t>
+            </a:r>
+            <a:r>
+              <a:rPr lang="nl-NL" baseline="0" dirty="0" smtClean="0"/>
+              <a:t> want </a:t>
+            </a:r>
+            <a:r>
+              <a:rPr lang="nl-NL" baseline="0" dirty="0" err="1" smtClean="0"/>
+              <a:t>to</a:t>
+            </a:r>
+            <a:r>
+              <a:rPr lang="nl-NL" baseline="0" dirty="0" smtClean="0"/>
+              <a:t> </a:t>
+            </a:r>
+            <a:r>
+              <a:rPr lang="nl-NL" baseline="0" dirty="0" err="1" smtClean="0"/>
+              <a:t>improve</a:t>
+            </a:r>
+            <a:endParaRPr lang="nl-NL" baseline="0" dirty="0" smtClean="0"/>
+          </a:p>
+          <a:p>
+            <a:r>
+              <a:rPr lang="nl-NL" baseline="0" dirty="0" smtClean="0"/>
+              <a:t>	Demo</a:t>
+            </a:r>
+          </a:p>
+          <a:p>
+            <a:r>
+              <a:rPr lang="nl-NL" baseline="0" dirty="0" smtClean="0"/>
+              <a:t>	Part 2 </a:t>
+            </a:r>
+            <a:r>
+              <a:rPr lang="nl-NL" baseline="0" dirty="0" err="1" smtClean="0"/>
+              <a:t>for</a:t>
+            </a:r>
+            <a:r>
+              <a:rPr lang="nl-NL" baseline="0" dirty="0" smtClean="0"/>
+              <a:t> software engineering</a:t>
+            </a:r>
+          </a:p>
+        </p:txBody>
+      </p:sp>
+      <p:sp>
+        <p:nvSpPr>
+          <p:cNvPr id="4" name="Slide Number Placeholder 3"/>
+          <p:cNvSpPr>
+            <a:spLocks noGrp="1"/>
+          </p:cNvSpPr>
+          <p:nvPr>
+            <p:ph type="sldNum" sz="quarter" idx="10"/>
+          </p:nvPr>
+        </p:nvSpPr>
+        <p:spPr/>
+        <p:txBody>
+          <a:bodyPr/>
+          <a:lstStyle/>
+          <a:p>
+            <a:fld id="{2EDF4D38-89ED-4567-AF2A-BD465BA01217}" type="slidenum">
+              <a:rPr lang="nl-NL" smtClean="0"/>
+              <a:t>2</a:t>
+            </a:fld>
+            <a:endParaRPr lang="nl-NL"/>
+          </a:p>
+        </p:txBody>
+      </p:sp>
+    </p:spTree>
+    <p:extLst>
+      <p:ext uri="{BB962C8B-B14F-4D97-AF65-F5344CB8AC3E}">
+        <p14:creationId xmlns:p14="http://schemas.microsoft.com/office/powerpoint/2010/main" val="3135424717"/>
+      </p:ext>
+    </p:extLst>
+  </p:cSld>
+  <p:clrMapOvr>
+    <a:masterClrMapping/>
+  </p:clrMapOvr>
+</p:notes>
+</file>
+
+<file path=ppt/notesSlides/notesSlide3.xml><?xml version="1.0" encoding="utf-8"?>
+<p:notes xmlns:a="http://schemas.openxmlformats.org/drawingml/2006/main" xmlns:r="http://schemas.openxmlformats.org/officeDocument/2006/relationships" xmlns:p="http://schemas.openxmlformats.org/presentationml/2006/main">
+  <p:cSld>
+    <p:spTree>
+      <p:nvGrpSpPr>
+        <p:cNvPr id="1" name=""/>
+        <p:cNvGrpSpPr/>
+        <p:nvPr/>
+      </p:nvGrpSpPr>
+      <p:grpSpPr>
+        <a:xfrm>
+          <a:off x="0" y="0"/>
+          <a:ext cx="0" cy="0"/>
+          <a:chOff x="0" y="0"/>
+          <a:chExt cx="0" cy="0"/>
+        </a:xfrm>
+      </p:grpSpPr>
+      <p:sp>
+        <p:nvSpPr>
+          <p:cNvPr id="2" name="Slide Image Placeholder 1"/>
+          <p:cNvSpPr>
+            <a:spLocks noGrp="1" noRot="1" noChangeAspect="1"/>
+          </p:cNvSpPr>
+          <p:nvPr>
+            <p:ph type="sldImg"/>
+          </p:nvPr>
+        </p:nvSpPr>
+        <p:spPr/>
+      </p:sp>
+      <p:sp>
+        <p:nvSpPr>
+          <p:cNvPr id="3" name="Notes Placeholder 2"/>
+          <p:cNvSpPr>
+            <a:spLocks noGrp="1"/>
+          </p:cNvSpPr>
+          <p:nvPr>
+            <p:ph type="body" idx="1"/>
+          </p:nvPr>
+        </p:nvSpPr>
+        <p:spPr/>
+        <p:txBody>
+          <a:bodyPr/>
+          <a:lstStyle/>
+          <a:p>
+            <a:r>
+              <a:rPr lang="nl-NL" dirty="0" smtClean="0"/>
+              <a:t>Short, </a:t>
+            </a:r>
+            <a:r>
+              <a:rPr lang="nl-NL" dirty="0" err="1" smtClean="0"/>
+              <a:t>everyone</a:t>
+            </a:r>
+            <a:r>
+              <a:rPr lang="nl-NL" baseline="0" dirty="0" smtClean="0"/>
+              <a:t> </a:t>
+            </a:r>
+            <a:r>
+              <a:rPr lang="nl-NL" baseline="0" dirty="0" err="1" smtClean="0"/>
+              <a:t>knows</a:t>
+            </a:r>
+            <a:r>
+              <a:rPr lang="nl-NL" baseline="0" dirty="0" smtClean="0"/>
+              <a:t> </a:t>
+            </a:r>
+            <a:r>
+              <a:rPr lang="nl-NL" baseline="0" dirty="0" err="1" smtClean="0"/>
+              <a:t>this</a:t>
+            </a:r>
+            <a:r>
+              <a:rPr lang="nl-NL" baseline="0" dirty="0" smtClean="0"/>
+              <a:t> </a:t>
+            </a:r>
+            <a:r>
+              <a:rPr lang="nl-NL" baseline="0" dirty="0" err="1" smtClean="0"/>
+              <a:t>already</a:t>
+            </a:r>
+            <a:r>
+              <a:rPr lang="nl-NL" baseline="0" dirty="0" smtClean="0"/>
+              <a:t>.</a:t>
+            </a:r>
+          </a:p>
+          <a:p>
+            <a:endParaRPr lang="nl-NL" baseline="0" dirty="0" smtClean="0"/>
+          </a:p>
+          <a:p>
+            <a:r>
+              <a:rPr lang="nl-NL" baseline="0" dirty="0" smtClean="0"/>
+              <a:t>Tell the </a:t>
+            </a:r>
+            <a:r>
+              <a:rPr lang="nl-NL" baseline="0" dirty="0" err="1" smtClean="0"/>
+              <a:t>entire</a:t>
+            </a:r>
+            <a:r>
+              <a:rPr lang="nl-NL" baseline="0" dirty="0" smtClean="0"/>
+              <a:t> ADMIRE story</a:t>
+            </a:r>
+          </a:p>
+        </p:txBody>
+      </p:sp>
+      <p:sp>
+        <p:nvSpPr>
+          <p:cNvPr id="4" name="Slide Number Placeholder 3"/>
+          <p:cNvSpPr>
+            <a:spLocks noGrp="1"/>
+          </p:cNvSpPr>
+          <p:nvPr>
+            <p:ph type="sldNum" sz="quarter" idx="10"/>
+          </p:nvPr>
+        </p:nvSpPr>
+        <p:spPr/>
+        <p:txBody>
+          <a:bodyPr/>
+          <a:lstStyle/>
+          <a:p>
+            <a:fld id="{2EDF4D38-89ED-4567-AF2A-BD465BA01217}" type="slidenum">
+              <a:rPr lang="nl-NL" smtClean="0"/>
+              <a:t>3</a:t>
+            </a:fld>
+            <a:endParaRPr lang="nl-NL"/>
+          </a:p>
+        </p:txBody>
+      </p:sp>
+    </p:spTree>
+    <p:extLst>
+      <p:ext uri="{BB962C8B-B14F-4D97-AF65-F5344CB8AC3E}">
+        <p14:creationId xmlns:p14="http://schemas.microsoft.com/office/powerpoint/2010/main" val="1830723041"/>
+      </p:ext>
+    </p:extLst>
+  </p:cSld>
+  <p:clrMapOvr>
+    <a:masterClrMapping/>
+  </p:clrMapOvr>
+</p:notes>
+</file>
+
+<file path=ppt/notesSlides/notesSlide4.xml><?xml version="1.0" encoding="utf-8"?>
+<p:notes xmlns:a="http://schemas.openxmlformats.org/drawingml/2006/main" xmlns:r="http://schemas.openxmlformats.org/officeDocument/2006/relationships" xmlns:p="http://schemas.openxmlformats.org/presentationml/2006/main">
+  <p:cSld>
+    <p:spTree>
+      <p:nvGrpSpPr>
+        <p:cNvPr id="1" name=""/>
+        <p:cNvGrpSpPr/>
+        <p:nvPr/>
+      </p:nvGrpSpPr>
+      <p:grpSpPr>
+        <a:xfrm>
+          <a:off x="0" y="0"/>
+          <a:ext cx="0" cy="0"/>
+          <a:chOff x="0" y="0"/>
+          <a:chExt cx="0" cy="0"/>
+        </a:xfrm>
+      </p:grpSpPr>
+      <p:sp>
+        <p:nvSpPr>
+          <p:cNvPr id="2" name="Slide Image Placeholder 1"/>
+          <p:cNvSpPr>
+            <a:spLocks noGrp="1" noRot="1" noChangeAspect="1"/>
+          </p:cNvSpPr>
+          <p:nvPr>
+            <p:ph type="sldImg"/>
+          </p:nvPr>
+        </p:nvSpPr>
+        <p:spPr/>
+      </p:sp>
+      <p:sp>
+        <p:nvSpPr>
+          <p:cNvPr id="3" name="Notes Placeholder 2"/>
+          <p:cNvSpPr>
+            <a:spLocks noGrp="1"/>
+          </p:cNvSpPr>
+          <p:nvPr>
+            <p:ph type="body" idx="1"/>
+          </p:nvPr>
+        </p:nvSpPr>
+        <p:spPr/>
+        <p:txBody>
+          <a:bodyPr/>
+          <a:lstStyle/>
+          <a:p>
+            <a:r>
+              <a:rPr lang="nl-NL" dirty="0" smtClean="0"/>
+              <a:t>Slide</a:t>
+            </a:r>
+            <a:r>
+              <a:rPr lang="nl-NL" baseline="0" dirty="0" smtClean="0"/>
+              <a:t> spreekt voor zich</a:t>
+            </a:r>
+            <a:endParaRPr lang="nl-NL" dirty="0"/>
+          </a:p>
+        </p:txBody>
+      </p:sp>
+      <p:sp>
+        <p:nvSpPr>
+          <p:cNvPr id="4" name="Slide Number Placeholder 3"/>
+          <p:cNvSpPr>
+            <a:spLocks noGrp="1"/>
+          </p:cNvSpPr>
+          <p:nvPr>
+            <p:ph type="sldNum" sz="quarter" idx="10"/>
+          </p:nvPr>
+        </p:nvSpPr>
+        <p:spPr/>
+        <p:txBody>
+          <a:bodyPr/>
+          <a:lstStyle/>
+          <a:p>
+            <a:fld id="{2EDF4D38-89ED-4567-AF2A-BD465BA01217}" type="slidenum">
+              <a:rPr lang="nl-NL" smtClean="0"/>
+              <a:t>4</a:t>
+            </a:fld>
+            <a:endParaRPr lang="nl-NL"/>
+          </a:p>
+        </p:txBody>
+      </p:sp>
+    </p:spTree>
+    <p:extLst>
+      <p:ext uri="{BB962C8B-B14F-4D97-AF65-F5344CB8AC3E}">
+        <p14:creationId xmlns:p14="http://schemas.microsoft.com/office/powerpoint/2010/main" val="988474083"/>
+      </p:ext>
+    </p:extLst>
+  </p:cSld>
+  <p:clrMapOvr>
+    <a:masterClrMapping/>
+  </p:clrMapOvr>
+</p:notes>
+</file>
+
+<file path=ppt/notesSlides/notesSlide5.xml><?xml version="1.0" encoding="utf-8"?>
+<p:notes xmlns:a="http://schemas.openxmlformats.org/drawingml/2006/main" xmlns:r="http://schemas.openxmlformats.org/officeDocument/2006/relationships" xmlns:p="http://schemas.openxmlformats.org/presentationml/2006/main">
+  <p:cSld>
+    <p:spTree>
+      <p:nvGrpSpPr>
+        <p:cNvPr id="1" name=""/>
+        <p:cNvGrpSpPr/>
+        <p:nvPr/>
+      </p:nvGrpSpPr>
+      <p:grpSpPr>
+        <a:xfrm>
+          <a:off x="0" y="0"/>
+          <a:ext cx="0" cy="0"/>
+          <a:chOff x="0" y="0"/>
+          <a:chExt cx="0" cy="0"/>
+        </a:xfrm>
+      </p:grpSpPr>
+      <p:sp>
+        <p:nvSpPr>
+          <p:cNvPr id="2" name="Slide Image Placeholder 1"/>
+          <p:cNvSpPr>
+            <a:spLocks noGrp="1" noRot="1" noChangeAspect="1"/>
+          </p:cNvSpPr>
+          <p:nvPr>
+            <p:ph type="sldImg"/>
+          </p:nvPr>
+        </p:nvSpPr>
+        <p:spPr/>
+      </p:sp>
+      <p:sp>
+        <p:nvSpPr>
+          <p:cNvPr id="3" name="Notes Placeholder 2"/>
+          <p:cNvSpPr>
+            <a:spLocks noGrp="1"/>
+          </p:cNvSpPr>
+          <p:nvPr>
+            <p:ph type="body" idx="1"/>
+          </p:nvPr>
+        </p:nvSpPr>
+        <p:spPr/>
+        <p:txBody>
+          <a:bodyPr/>
+          <a:lstStyle/>
+          <a:p>
+            <a:r>
+              <a:rPr lang="nl-NL" dirty="0" smtClean="0"/>
+              <a:t>Tell stuff </a:t>
+            </a:r>
+            <a:r>
+              <a:rPr lang="nl-NL" dirty="0" err="1" smtClean="0"/>
+              <a:t>about</a:t>
+            </a:r>
+            <a:r>
+              <a:rPr lang="nl-NL" dirty="0" smtClean="0"/>
+              <a:t> </a:t>
+            </a:r>
+            <a:r>
+              <a:rPr lang="nl-NL" dirty="0" err="1" smtClean="0"/>
+              <a:t>other</a:t>
+            </a:r>
+            <a:r>
+              <a:rPr lang="nl-NL" dirty="0" smtClean="0"/>
+              <a:t> analysis</a:t>
+            </a:r>
+            <a:r>
+              <a:rPr lang="nl-NL" baseline="0" dirty="0" smtClean="0"/>
+              <a:t> tools </a:t>
+            </a:r>
+            <a:r>
+              <a:rPr lang="nl-NL" baseline="0" dirty="0" err="1" smtClean="0"/>
+              <a:t>too</a:t>
+            </a:r>
+            <a:r>
+              <a:rPr lang="nl-NL" baseline="0" dirty="0" smtClean="0"/>
+              <a:t> </a:t>
+            </a:r>
+            <a:r>
+              <a:rPr lang="nl-NL" baseline="0" dirty="0" err="1" smtClean="0"/>
+              <a:t>generic</a:t>
+            </a:r>
+            <a:r>
+              <a:rPr lang="nl-NL" baseline="0" dirty="0" smtClean="0"/>
+              <a:t>, </a:t>
+            </a:r>
+            <a:r>
+              <a:rPr lang="nl-NL" baseline="0" dirty="0" err="1" smtClean="0"/>
+              <a:t>ours</a:t>
+            </a:r>
+            <a:r>
+              <a:rPr lang="nl-NL" baseline="0" dirty="0" smtClean="0"/>
+              <a:t> is </a:t>
+            </a:r>
+            <a:r>
+              <a:rPr lang="nl-NL" baseline="0" dirty="0" err="1" smtClean="0"/>
+              <a:t>specialized</a:t>
+            </a:r>
+            <a:r>
+              <a:rPr lang="nl-NL" baseline="0" dirty="0" smtClean="0"/>
+              <a:t> </a:t>
+            </a:r>
+            <a:r>
+              <a:rPr lang="nl-NL" baseline="0" dirty="0" err="1" smtClean="0"/>
+              <a:t>and</a:t>
+            </a:r>
+            <a:r>
+              <a:rPr lang="nl-NL" baseline="0" dirty="0" smtClean="0"/>
+              <a:t> </a:t>
+            </a:r>
+            <a:r>
+              <a:rPr lang="nl-NL" baseline="0" dirty="0" err="1" smtClean="0"/>
+              <a:t>thus</a:t>
+            </a:r>
+            <a:r>
+              <a:rPr lang="nl-NL" baseline="0" dirty="0" smtClean="0"/>
+              <a:t> </a:t>
+            </a:r>
+            <a:r>
+              <a:rPr lang="nl-NL" baseline="0" dirty="0" err="1" smtClean="0"/>
+              <a:t>easier</a:t>
+            </a:r>
+            <a:r>
+              <a:rPr lang="nl-NL" baseline="0" dirty="0" smtClean="0"/>
+              <a:t> </a:t>
+            </a:r>
+            <a:r>
+              <a:rPr lang="nl-NL" baseline="0" dirty="0" err="1" smtClean="0"/>
+              <a:t>to</a:t>
+            </a:r>
+            <a:r>
+              <a:rPr lang="nl-NL" baseline="0" dirty="0" smtClean="0"/>
+              <a:t> </a:t>
+            </a:r>
+            <a:r>
+              <a:rPr lang="nl-NL" baseline="0" dirty="0" err="1" smtClean="0"/>
+              <a:t>use</a:t>
+            </a:r>
+            <a:r>
+              <a:rPr lang="nl-NL" baseline="0" dirty="0" smtClean="0"/>
+              <a:t>.</a:t>
+            </a:r>
+            <a:endParaRPr lang="nl-NL" dirty="0"/>
+          </a:p>
+        </p:txBody>
+      </p:sp>
+      <p:sp>
+        <p:nvSpPr>
+          <p:cNvPr id="4" name="Slide Number Placeholder 3"/>
+          <p:cNvSpPr>
+            <a:spLocks noGrp="1"/>
+          </p:cNvSpPr>
+          <p:nvPr>
+            <p:ph type="sldNum" sz="quarter" idx="10"/>
+          </p:nvPr>
+        </p:nvSpPr>
+        <p:spPr/>
+        <p:txBody>
+          <a:bodyPr/>
+          <a:lstStyle/>
+          <a:p>
+            <a:fld id="{2EDF4D38-89ED-4567-AF2A-BD465BA01217}" type="slidenum">
+              <a:rPr lang="nl-NL" smtClean="0"/>
+              <a:t>5</a:t>
+            </a:fld>
+            <a:endParaRPr lang="nl-NL"/>
+          </a:p>
+        </p:txBody>
+      </p:sp>
+    </p:spTree>
+    <p:extLst>
+      <p:ext uri="{BB962C8B-B14F-4D97-AF65-F5344CB8AC3E}">
+        <p14:creationId xmlns:p14="http://schemas.microsoft.com/office/powerpoint/2010/main" val="1738663991"/>
+      </p:ext>
+    </p:extLst>
+  </p:cSld>
+  <p:clrMapOvr>
+    <a:masterClrMapping/>
+  </p:clrMapOvr>
+</p:notes>
+</file>
+
+<file path=ppt/notesSlides/notesSlide6.xml><?xml version="1.0" encoding="utf-8"?>
+<p:notes xmlns:a="http://schemas.openxmlformats.org/drawingml/2006/main" xmlns:r="http://schemas.openxmlformats.org/officeDocument/2006/relationships" xmlns:p="http://schemas.openxmlformats.org/presentationml/2006/main">
+  <p:cSld>
+    <p:spTree>
+      <p:nvGrpSpPr>
+        <p:cNvPr id="1" name=""/>
+        <p:cNvGrpSpPr/>
+        <p:nvPr/>
+      </p:nvGrpSpPr>
+      <p:grpSpPr>
+        <a:xfrm>
+          <a:off x="0" y="0"/>
+          <a:ext cx="0" cy="0"/>
+          <a:chOff x="0" y="0"/>
+          <a:chExt cx="0" cy="0"/>
+        </a:xfrm>
+      </p:grpSpPr>
+      <p:sp>
+        <p:nvSpPr>
+          <p:cNvPr id="2" name="Slide Image Placeholder 1"/>
+          <p:cNvSpPr>
+            <a:spLocks noGrp="1" noRot="1" noChangeAspect="1"/>
+          </p:cNvSpPr>
+          <p:nvPr>
+            <p:ph type="sldImg"/>
+          </p:nvPr>
+        </p:nvSpPr>
+        <p:spPr/>
+      </p:sp>
+      <p:sp>
+        <p:nvSpPr>
+          <p:cNvPr id="3" name="Notes Placeholder 2"/>
+          <p:cNvSpPr>
+            <a:spLocks noGrp="1"/>
+          </p:cNvSpPr>
+          <p:nvPr>
+            <p:ph type="body" idx="1"/>
+          </p:nvPr>
+        </p:nvSpPr>
+        <p:spPr/>
+        <p:txBody>
+          <a:bodyPr/>
+          <a:lstStyle/>
+          <a:p>
+            <a:r>
+              <a:rPr lang="nl-NL" dirty="0" err="1" smtClean="0"/>
+              <a:t>Final</a:t>
+            </a:r>
+            <a:r>
+              <a:rPr lang="nl-NL" dirty="0" smtClean="0"/>
+              <a:t> product is </a:t>
+            </a:r>
+            <a:r>
+              <a:rPr lang="nl-NL" dirty="0" err="1" smtClean="0"/>
+              <a:t>composed</a:t>
+            </a:r>
+            <a:r>
+              <a:rPr lang="nl-NL" baseline="0" dirty="0" smtClean="0"/>
+              <a:t> of these 5 modules</a:t>
+            </a:r>
+          </a:p>
+          <a:p>
+            <a:endParaRPr lang="nl-NL" baseline="0" dirty="0" smtClean="0"/>
+          </a:p>
+          <a:p>
+            <a:r>
+              <a:rPr lang="nl-NL" baseline="0" dirty="0" smtClean="0"/>
+              <a:t>Import -&gt; </a:t>
+            </a:r>
+            <a:r>
+              <a:rPr lang="nl-NL" baseline="0" dirty="0" err="1" smtClean="0"/>
+              <a:t>importing</a:t>
+            </a:r>
+            <a:r>
+              <a:rPr lang="nl-NL" baseline="0" dirty="0" smtClean="0"/>
+              <a:t> data</a:t>
+            </a:r>
+          </a:p>
+          <a:p>
+            <a:r>
+              <a:rPr lang="nl-NL" baseline="0" dirty="0" smtClean="0"/>
+              <a:t>View -&gt; view the </a:t>
+            </a:r>
+            <a:r>
+              <a:rPr lang="nl-NL" baseline="0" dirty="0" err="1" smtClean="0"/>
+              <a:t>imported</a:t>
+            </a:r>
+            <a:r>
+              <a:rPr lang="nl-NL" baseline="0" dirty="0" smtClean="0"/>
+              <a:t> data</a:t>
+            </a:r>
+          </a:p>
+          <a:p>
+            <a:r>
+              <a:rPr lang="nl-NL" baseline="0" dirty="0" smtClean="0"/>
+              <a:t>Analyse -&gt; </a:t>
+            </a:r>
+            <a:r>
+              <a:rPr lang="nl-NL" baseline="0" dirty="0" err="1" smtClean="0"/>
+              <a:t>write</a:t>
+            </a:r>
+            <a:r>
+              <a:rPr lang="nl-NL" baseline="0" dirty="0" smtClean="0"/>
+              <a:t> </a:t>
+            </a:r>
+            <a:r>
+              <a:rPr lang="nl-NL" baseline="0" dirty="0" err="1" smtClean="0"/>
+              <a:t>and</a:t>
+            </a:r>
+            <a:r>
+              <a:rPr lang="nl-NL" baseline="0" dirty="0" smtClean="0"/>
+              <a:t> </a:t>
+            </a:r>
+            <a:r>
+              <a:rPr lang="nl-NL" baseline="0" dirty="0" err="1" smtClean="0"/>
+              <a:t>perform</a:t>
+            </a:r>
+            <a:r>
+              <a:rPr lang="nl-NL" baseline="0" dirty="0" smtClean="0"/>
+              <a:t> analysis</a:t>
+            </a:r>
+          </a:p>
+          <a:p>
+            <a:r>
+              <a:rPr lang="nl-NL" baseline="0" dirty="0" err="1" smtClean="0"/>
+              <a:t>Visualize</a:t>
+            </a:r>
+            <a:r>
+              <a:rPr lang="nl-NL" baseline="0" dirty="0" smtClean="0"/>
+              <a:t> -&gt; turn data </a:t>
+            </a:r>
+            <a:r>
+              <a:rPr lang="nl-NL" baseline="0" dirty="0" err="1" smtClean="0"/>
+              <a:t>into</a:t>
+            </a:r>
+            <a:r>
+              <a:rPr lang="nl-NL" baseline="0" dirty="0" smtClean="0"/>
+              <a:t> </a:t>
+            </a:r>
+            <a:r>
+              <a:rPr lang="nl-NL" baseline="0" dirty="0" err="1" smtClean="0"/>
+              <a:t>graphs</a:t>
+            </a:r>
+            <a:endParaRPr lang="nl-NL" baseline="0" dirty="0" smtClean="0"/>
+          </a:p>
+          <a:p>
+            <a:r>
+              <a:rPr lang="nl-NL" baseline="0" dirty="0" smtClean="0"/>
+              <a:t>Export -&gt; export data </a:t>
+            </a:r>
+            <a:r>
+              <a:rPr lang="nl-NL" baseline="0" dirty="0" err="1" smtClean="0"/>
+              <a:t>to</a:t>
+            </a:r>
+            <a:r>
+              <a:rPr lang="nl-NL" baseline="0" dirty="0" smtClean="0"/>
+              <a:t> </a:t>
+            </a:r>
+            <a:r>
+              <a:rPr lang="nl-NL" baseline="0" dirty="0" err="1" smtClean="0"/>
+              <a:t>be</a:t>
+            </a:r>
+            <a:r>
+              <a:rPr lang="nl-NL" baseline="0" dirty="0" smtClean="0"/>
+              <a:t> </a:t>
+            </a:r>
+            <a:r>
+              <a:rPr lang="nl-NL" baseline="0" dirty="0" err="1" smtClean="0"/>
+              <a:t>used</a:t>
+            </a:r>
+            <a:r>
+              <a:rPr lang="nl-NL" baseline="0" dirty="0" smtClean="0"/>
+              <a:t> in </a:t>
+            </a:r>
+            <a:r>
+              <a:rPr lang="nl-NL" baseline="0" dirty="0" err="1" smtClean="0"/>
+              <a:t>other</a:t>
+            </a:r>
+            <a:r>
+              <a:rPr lang="nl-NL" baseline="0" dirty="0" smtClean="0"/>
+              <a:t> tools</a:t>
+            </a:r>
+            <a:endParaRPr lang="nl-NL" dirty="0"/>
+          </a:p>
+        </p:txBody>
+      </p:sp>
+      <p:sp>
+        <p:nvSpPr>
+          <p:cNvPr id="4" name="Slide Number Placeholder 3"/>
+          <p:cNvSpPr>
+            <a:spLocks noGrp="1"/>
+          </p:cNvSpPr>
+          <p:nvPr>
+            <p:ph type="sldNum" sz="quarter" idx="10"/>
+          </p:nvPr>
+        </p:nvSpPr>
+        <p:spPr/>
+        <p:txBody>
+          <a:bodyPr/>
+          <a:lstStyle/>
+          <a:p>
+            <a:fld id="{2EDF4D38-89ED-4567-AF2A-BD465BA01217}" type="slidenum">
+              <a:rPr lang="nl-NL" smtClean="0"/>
+              <a:t>6</a:t>
+            </a:fld>
+            <a:endParaRPr lang="nl-NL"/>
+          </a:p>
+        </p:txBody>
+      </p:sp>
+    </p:spTree>
+    <p:extLst>
+      <p:ext uri="{BB962C8B-B14F-4D97-AF65-F5344CB8AC3E}">
+        <p14:creationId xmlns:p14="http://schemas.microsoft.com/office/powerpoint/2010/main" val="178508602"/>
+      </p:ext>
+    </p:extLst>
+  </p:cSld>
+  <p:clrMapOvr>
+    <a:masterClrMapping/>
+  </p:clrMapOvr>
+</p:notes>
+</file>
+
+<file path=ppt/notesSlides/notesSlide7.xml><?xml version="1.0" encoding="utf-8"?>
+<p:notes xmlns:a="http://schemas.openxmlformats.org/drawingml/2006/main" xmlns:r="http://schemas.openxmlformats.org/officeDocument/2006/relationships" xmlns:p="http://schemas.openxmlformats.org/presentationml/2006/main">
+  <p:cSld>
+    <p:spTree>
+      <p:nvGrpSpPr>
+        <p:cNvPr id="1" name=""/>
+        <p:cNvGrpSpPr/>
+        <p:nvPr/>
+      </p:nvGrpSpPr>
+      <p:grpSpPr>
+        <a:xfrm>
+          <a:off x="0" y="0"/>
+          <a:ext cx="0" cy="0"/>
+          <a:chOff x="0" y="0"/>
+          <a:chExt cx="0" cy="0"/>
+        </a:xfrm>
+      </p:grpSpPr>
+      <p:sp>
+        <p:nvSpPr>
+          <p:cNvPr id="2" name="Slide Image Placeholder 1"/>
+          <p:cNvSpPr>
+            <a:spLocks noGrp="1" noRot="1" noChangeAspect="1"/>
+          </p:cNvSpPr>
+          <p:nvPr>
+            <p:ph type="sldImg"/>
+          </p:nvPr>
+        </p:nvSpPr>
+        <p:spPr/>
+      </p:sp>
+      <p:sp>
+        <p:nvSpPr>
+          <p:cNvPr id="3" name="Notes Placeholder 2"/>
+          <p:cNvSpPr>
+            <a:spLocks noGrp="1"/>
+          </p:cNvSpPr>
+          <p:nvPr>
+            <p:ph type="body" idx="1"/>
+          </p:nvPr>
+        </p:nvSpPr>
+        <p:spPr/>
+        <p:txBody>
+          <a:bodyPr/>
+          <a:lstStyle/>
+          <a:p>
+            <a:r>
+              <a:rPr lang="nl-NL" dirty="0" smtClean="0"/>
+              <a:t>Spreekt voor zichzelf</a:t>
+            </a:r>
+            <a:endParaRPr lang="nl-NL" dirty="0"/>
+          </a:p>
+        </p:txBody>
+      </p:sp>
+      <p:sp>
+        <p:nvSpPr>
+          <p:cNvPr id="4" name="Slide Number Placeholder 3"/>
+          <p:cNvSpPr>
+            <a:spLocks noGrp="1"/>
+          </p:cNvSpPr>
+          <p:nvPr>
+            <p:ph type="sldNum" sz="quarter" idx="10"/>
+          </p:nvPr>
+        </p:nvSpPr>
+        <p:spPr/>
+        <p:txBody>
+          <a:bodyPr/>
+          <a:lstStyle/>
+          <a:p>
+            <a:fld id="{2EDF4D38-89ED-4567-AF2A-BD465BA01217}" type="slidenum">
+              <a:rPr lang="nl-NL" smtClean="0"/>
+              <a:t>7</a:t>
+            </a:fld>
+            <a:endParaRPr lang="nl-NL"/>
+          </a:p>
+        </p:txBody>
+      </p:sp>
+    </p:spTree>
+    <p:extLst>
+      <p:ext uri="{BB962C8B-B14F-4D97-AF65-F5344CB8AC3E}">
+        <p14:creationId xmlns:p14="http://schemas.microsoft.com/office/powerpoint/2010/main" val="680326735"/>
+      </p:ext>
+    </p:extLst>
+  </p:cSld>
+  <p:clrMapOvr>
+    <a:masterClrMapping/>
+  </p:clrMapOvr>
+</p:notes>
+</file>
+
+<file path=ppt/notesSlides/notesSlide8.xml><?xml version="1.0" encoding="utf-8"?>
+<p:notes xmlns:a="http://schemas.openxmlformats.org/drawingml/2006/main" xmlns:r="http://schemas.openxmlformats.org/officeDocument/2006/relationships" xmlns:p="http://schemas.openxmlformats.org/presentationml/2006/main">
+  <p:cSld>
+    <p:spTree>
+      <p:nvGrpSpPr>
+        <p:cNvPr id="1" name=""/>
+        <p:cNvGrpSpPr/>
+        <p:nvPr/>
+      </p:nvGrpSpPr>
+      <p:grpSpPr>
+        <a:xfrm>
+          <a:off x="0" y="0"/>
+          <a:ext cx="0" cy="0"/>
+          <a:chOff x="0" y="0"/>
+          <a:chExt cx="0" cy="0"/>
+        </a:xfrm>
+      </p:grpSpPr>
+      <p:sp>
+        <p:nvSpPr>
+          <p:cNvPr id="2" name="Slide Image Placeholder 1"/>
+          <p:cNvSpPr>
+            <a:spLocks noGrp="1" noRot="1" noChangeAspect="1"/>
+          </p:cNvSpPr>
+          <p:nvPr>
+            <p:ph type="sldImg"/>
+          </p:nvPr>
+        </p:nvSpPr>
+        <p:spPr/>
+      </p:sp>
+      <p:sp>
+        <p:nvSpPr>
+          <p:cNvPr id="3" name="Notes Placeholder 2"/>
+          <p:cNvSpPr>
+            <a:spLocks noGrp="1"/>
+          </p:cNvSpPr>
+          <p:nvPr>
+            <p:ph type="body" idx="1"/>
+          </p:nvPr>
+        </p:nvSpPr>
+        <p:spPr/>
+        <p:txBody>
+          <a:bodyPr/>
+          <a:lstStyle/>
+          <a:p>
+            <a:r>
+              <a:rPr lang="nl-NL" dirty="0" smtClean="0"/>
+              <a:t>Spreekt voor zichzelf</a:t>
+            </a:r>
+          </a:p>
+          <a:p>
+            <a:endParaRPr lang="nl-NL" dirty="0" smtClean="0"/>
+          </a:p>
+          <a:p>
+            <a:r>
+              <a:rPr lang="nl-NL" dirty="0" err="1" smtClean="0"/>
+              <a:t>Additional</a:t>
+            </a:r>
+            <a:r>
+              <a:rPr lang="nl-NL" baseline="0" dirty="0" smtClean="0"/>
+              <a:t> </a:t>
+            </a:r>
+            <a:r>
+              <a:rPr lang="nl-NL" baseline="0" dirty="0" err="1" smtClean="0"/>
+              <a:t>functions</a:t>
+            </a:r>
+            <a:r>
+              <a:rPr lang="nl-NL" baseline="0" dirty="0" smtClean="0"/>
+              <a:t> </a:t>
+            </a:r>
+            <a:r>
+              <a:rPr lang="nl-NL" baseline="0" dirty="0" err="1" smtClean="0"/>
+              <a:t>like</a:t>
+            </a:r>
+            <a:r>
+              <a:rPr lang="nl-NL" baseline="0" dirty="0" smtClean="0"/>
+              <a:t> set operations </a:t>
+            </a:r>
+            <a:r>
+              <a:rPr lang="nl-NL" baseline="0" dirty="0" err="1" smtClean="0"/>
+              <a:t>such</a:t>
+            </a:r>
+            <a:r>
+              <a:rPr lang="nl-NL" baseline="0" dirty="0" smtClean="0"/>
+              <a:t> as </a:t>
+            </a:r>
+            <a:r>
+              <a:rPr lang="nl-NL" baseline="0" dirty="0" err="1" smtClean="0"/>
+              <a:t>union</a:t>
+            </a:r>
+            <a:r>
+              <a:rPr lang="nl-NL" baseline="0" dirty="0" smtClean="0"/>
+              <a:t> </a:t>
+            </a:r>
+            <a:r>
+              <a:rPr lang="nl-NL" baseline="0" dirty="0" err="1" smtClean="0"/>
+              <a:t>and</a:t>
+            </a:r>
+            <a:r>
+              <a:rPr lang="nl-NL" baseline="0" dirty="0" smtClean="0"/>
+              <a:t> </a:t>
+            </a:r>
+            <a:r>
+              <a:rPr lang="nl-NL" baseline="0" dirty="0" err="1" smtClean="0"/>
+              <a:t>difference</a:t>
+            </a:r>
+            <a:r>
+              <a:rPr lang="nl-NL" baseline="0" dirty="0" smtClean="0"/>
+              <a:t> </a:t>
+            </a:r>
+            <a:r>
+              <a:rPr lang="nl-NL" baseline="0" dirty="0" err="1" smtClean="0"/>
+              <a:t>to</a:t>
+            </a:r>
+            <a:r>
+              <a:rPr lang="nl-NL" baseline="0" dirty="0" smtClean="0"/>
+              <a:t> </a:t>
+            </a:r>
+            <a:r>
+              <a:rPr lang="nl-NL" baseline="0" dirty="0" err="1" smtClean="0"/>
+              <a:t>ease</a:t>
+            </a:r>
+            <a:r>
+              <a:rPr lang="nl-NL" baseline="0" dirty="0" smtClean="0"/>
+              <a:t> analysis </a:t>
+            </a:r>
+            <a:r>
+              <a:rPr lang="nl-NL" baseline="0" dirty="0" err="1" smtClean="0"/>
+              <a:t>writing</a:t>
+            </a:r>
+            <a:r>
+              <a:rPr lang="nl-NL" baseline="0" dirty="0" smtClean="0"/>
+              <a:t>.</a:t>
+            </a:r>
+            <a:endParaRPr lang="nl-NL" dirty="0"/>
+          </a:p>
+        </p:txBody>
+      </p:sp>
+      <p:sp>
+        <p:nvSpPr>
+          <p:cNvPr id="4" name="Slide Number Placeholder 3"/>
+          <p:cNvSpPr>
+            <a:spLocks noGrp="1"/>
+          </p:cNvSpPr>
+          <p:nvPr>
+            <p:ph type="sldNum" sz="quarter" idx="10"/>
+          </p:nvPr>
+        </p:nvSpPr>
+        <p:spPr/>
+        <p:txBody>
+          <a:bodyPr/>
+          <a:lstStyle/>
+          <a:p>
+            <a:fld id="{2EDF4D38-89ED-4567-AF2A-BD465BA01217}" type="slidenum">
+              <a:rPr lang="nl-NL" smtClean="0"/>
+              <a:t>8</a:t>
+            </a:fld>
+            <a:endParaRPr lang="nl-NL"/>
+          </a:p>
+        </p:txBody>
+      </p:sp>
+    </p:spTree>
+    <p:extLst>
+      <p:ext uri="{BB962C8B-B14F-4D97-AF65-F5344CB8AC3E}">
+        <p14:creationId xmlns:p14="http://schemas.microsoft.com/office/powerpoint/2010/main" val="3942501449"/>
+      </p:ext>
+    </p:extLst>
+  </p:cSld>
+  <p:clrMapOvr>
+    <a:masterClrMapping/>
+  </p:clrMapOvr>
+</p:notes>
+</file>
+
+<file path=ppt/notesSlides/notesSlide9.xml><?xml version="1.0" encoding="utf-8"?>
+<p:notes xmlns:a="http://schemas.openxmlformats.org/drawingml/2006/main" xmlns:r="http://schemas.openxmlformats.org/officeDocument/2006/relationships" xmlns:p="http://schemas.openxmlformats.org/presentationml/2006/main">
+  <p:cSld>
+    <p:spTree>
+      <p:nvGrpSpPr>
+        <p:cNvPr id="1" name=""/>
+        <p:cNvGrpSpPr/>
+        <p:nvPr/>
+      </p:nvGrpSpPr>
+      <p:grpSpPr>
+        <a:xfrm>
+          <a:off x="0" y="0"/>
+          <a:ext cx="0" cy="0"/>
+          <a:chOff x="0" y="0"/>
+          <a:chExt cx="0" cy="0"/>
+        </a:xfrm>
+      </p:grpSpPr>
+      <p:sp>
+        <p:nvSpPr>
+          <p:cNvPr id="2" name="Slide Image Placeholder 1"/>
+          <p:cNvSpPr>
+            <a:spLocks noGrp="1" noRot="1" noChangeAspect="1"/>
+          </p:cNvSpPr>
+          <p:nvPr>
+            <p:ph type="sldImg"/>
+          </p:nvPr>
+        </p:nvSpPr>
+        <p:spPr/>
+      </p:sp>
+      <p:sp>
+        <p:nvSpPr>
+          <p:cNvPr id="3" name="Notes Placeholder 2"/>
+          <p:cNvSpPr>
+            <a:spLocks noGrp="1"/>
+          </p:cNvSpPr>
+          <p:nvPr>
+            <p:ph type="body" idx="1"/>
+          </p:nvPr>
+        </p:nvSpPr>
+        <p:spPr/>
+        <p:txBody>
+          <a:bodyPr/>
+          <a:lstStyle/>
+          <a:p>
+            <a:r>
+              <a:rPr lang="nl-NL" dirty="0" smtClean="0"/>
+              <a:t>Spreekt voor zichzelf</a:t>
+            </a:r>
+            <a:endParaRPr lang="nl-NL" dirty="0"/>
+          </a:p>
+        </p:txBody>
+      </p:sp>
+      <p:sp>
+        <p:nvSpPr>
+          <p:cNvPr id="4" name="Slide Number Placeholder 3"/>
+          <p:cNvSpPr>
+            <a:spLocks noGrp="1"/>
+          </p:cNvSpPr>
+          <p:nvPr>
+            <p:ph type="sldNum" sz="quarter" idx="10"/>
+          </p:nvPr>
+        </p:nvSpPr>
+        <p:spPr/>
+        <p:txBody>
+          <a:bodyPr/>
+          <a:lstStyle/>
+          <a:p>
+            <a:fld id="{2EDF4D38-89ED-4567-AF2A-BD465BA01217}" type="slidenum">
+              <a:rPr lang="nl-NL" smtClean="0"/>
+              <a:t>9</a:t>
+            </a:fld>
+            <a:endParaRPr lang="nl-NL"/>
+          </a:p>
+        </p:txBody>
+      </p:sp>
+    </p:spTree>
+    <p:extLst>
+      <p:ext uri="{BB962C8B-B14F-4D97-AF65-F5344CB8AC3E}">
+        <p14:creationId xmlns:p14="http://schemas.microsoft.com/office/powerpoint/2010/main" val="1259315059"/>
+      </p:ext>
+    </p:extLst>
+  </p:cSld>
+  <p:clrMapOvr>
+    <a:masterClrMapping/>
+  </p:clrMapOvr>
+</p:notes>
 </file>
 
 <file path=ppt/slideLayouts/slideLayout1.xml><?xml version="1.0" encoding="utf-8"?>
@@ -269,7 +2730,7 @@
                 </a:solidFill>
               </a:rPr>
               <a:pPr algn="r"/>
-              <a:t>‹nr.›</a:t>
+              <a:t>‹#›</a:t>
             </a:fld>
             <a:endParaRPr lang="en-US" sz="1400" dirty="0">
               <a:solidFill>
@@ -369,7 +2830,7 @@
                 </a:solidFill>
               </a:rPr>
               <a:pPr algn="r"/>
-              <a:t>‹nr.›</a:t>
+              <a:t>‹#›</a:t>
             </a:fld>
             <a:endParaRPr lang="en-US" sz="1400" dirty="0">
               <a:solidFill>
@@ -560,7 +3021,7 @@
                 </a:solidFill>
               </a:rPr>
               <a:pPr algn="r"/>
-              <a:t>‹nr.›</a:t>
+              <a:t>‹#›</a:t>
             </a:fld>
             <a:endParaRPr lang="en-US" sz="1400" dirty="0">
               <a:solidFill>
@@ -1007,14 +3468,14 @@
           </a:ln>
           <a:extLst>
             <a:ext uri="{909E8E84-426E-40dd-AFC4-6F175D3DCCD1}">
-              <a14:hiddenFill xmlns:a14="http://schemas.microsoft.com/office/drawing/2010/main">
+              <a14:hiddenFill xmlns:a14="http://schemas.microsoft.com/office/drawing/2010/main" xmlns="">
                 <a:solidFill>
                   <a:srgbClr val="FFFFFF"/>
                 </a:solidFill>
               </a14:hiddenFill>
             </a:ext>
             <a:ext uri="{91240B29-F687-4f45-9708-019B960494DF}">
-              <a14:hiddenLine xmlns:a14="http://schemas.microsoft.com/office/drawing/2010/main" w="9525">
+              <a14:hiddenLine xmlns:a14="http://schemas.microsoft.com/office/drawing/2010/main" xmlns="" w="9525">
                 <a:solidFill>
                   <a:srgbClr val="000000"/>
                 </a:solidFill>
@@ -1193,14 +3654,14 @@
           </a:ln>
           <a:extLst>
             <a:ext uri="{909E8E84-426E-40dd-AFC4-6F175D3DCCD1}">
-              <a14:hiddenFill xmlns:a14="http://schemas.microsoft.com/office/drawing/2010/main">
+              <a14:hiddenFill xmlns:a14="http://schemas.microsoft.com/office/drawing/2010/main" xmlns="">
                 <a:solidFill>
                   <a:srgbClr val="FFFFFF"/>
                 </a:solidFill>
               </a14:hiddenFill>
             </a:ext>
             <a:ext uri="{91240B29-F687-4f45-9708-019B960494DF}">
-              <a14:hiddenLine xmlns:a14="http://schemas.microsoft.com/office/drawing/2010/main" w="9525">
+              <a14:hiddenLine xmlns:a14="http://schemas.microsoft.com/office/drawing/2010/main" xmlns="" w="9525">
                 <a:solidFill>
                   <a:srgbClr val="000000"/>
                 </a:solidFill>
@@ -1351,7 +3812,7 @@
           <p:nvPr/>
         </p:nvPicPr>
         <p:blipFill>
-          <a:blip r:embed="rId2">
+          <a:blip r:embed="rId3">
             <a:extLst>
               <a:ext uri="{28A0092B-C50C-407E-A947-70E740481C1C}">
                 <a14:useLocalDpi xmlns:a14="http://schemas.microsoft.com/office/drawing/2010/main" val="0"/>
@@ -1385,7 +3846,7 @@
   <p:timing>
     <p:tnLst>
       <p:par>
-        <p:cTn xmlns:p14="http://schemas.microsoft.com/office/powerpoint/2010/main" id="1" dur="indefinite" restart="never" nodeType="tmRoot"/>
+        <p:cTn id="1" dur="indefinite" restart="never" nodeType="tmRoot"/>
       </p:par>
     </p:tnLst>
   </p:timing>
@@ -1431,14 +3892,14 @@
           </a:ln>
           <a:extLst>
             <a:ext uri="{909E8E84-426E-40dd-AFC4-6F175D3DCCD1}">
-              <a14:hiddenFill xmlns:a14="http://schemas.microsoft.com/office/drawing/2010/main">
+              <a14:hiddenFill xmlns:a14="http://schemas.microsoft.com/office/drawing/2010/main" xmlns="">
                 <a:solidFill>
                   <a:srgbClr val="FFFFFF"/>
                 </a:solidFill>
               </a14:hiddenFill>
             </a:ext>
             <a:ext uri="{91240B29-F687-4f45-9708-019B960494DF}">
-              <a14:hiddenLine xmlns:a14="http://schemas.microsoft.com/office/drawing/2010/main" w="9525">
+              <a14:hiddenLine xmlns:a14="http://schemas.microsoft.com/office/drawing/2010/main" xmlns="" w="9525">
                 <a:solidFill>
                   <a:srgbClr val="000000"/>
                 </a:solidFill>
@@ -1607,23 +4068,8 @@
                 <a:cs typeface="Arial"/>
                 <a:sym typeface="Tahoma" charset="0"/>
               </a:rPr>
-              <a:t>Usable in </a:t>
-            </a:r>
-            <a:r>
-              <a:rPr lang="en-US" sz="3600" dirty="0" smtClean="0">
-                <a:latin typeface="Arial"/>
-                <a:ea typeface="ヒラギノ角ゴ ProN W3" charset="0"/>
-                <a:cs typeface="Arial"/>
-                <a:sym typeface="Tahoma" charset="0"/>
-              </a:rPr>
-              <a:t>e.g. SPSS </a:t>
-            </a:r>
-            <a:endParaRPr lang="en-US" sz="3600" dirty="0" smtClean="0">
-              <a:latin typeface="Arial"/>
-              <a:ea typeface="ヒラギノ角ゴ ProN W3" charset="0"/>
-              <a:cs typeface="Arial"/>
-              <a:sym typeface="Tahoma" charset="0"/>
-            </a:endParaRPr>
+              <a:t>Usable in e.g. SPSS </a:t>
+            </a:r>
           </a:p>
         </p:txBody>
       </p:sp>
@@ -1687,7 +4133,7 @@
           <p:nvPr/>
         </p:nvPicPr>
         <p:blipFill>
-          <a:blip r:embed="rId2">
+          <a:blip r:embed="rId3">
             <a:extLst>
               <a:ext uri="{28A0092B-C50C-407E-A947-70E740481C1C}">
                 <a14:useLocalDpi xmlns:a14="http://schemas.microsoft.com/office/drawing/2010/main" val="0"/>
@@ -1721,7 +4167,7 @@
   <p:timing>
     <p:tnLst>
       <p:par>
-        <p:cTn xmlns:p14="http://schemas.microsoft.com/office/powerpoint/2010/main" id="1" dur="indefinite" restart="never" nodeType="tmRoot"/>
+        <p:cTn id="1" dur="indefinite" restart="never" nodeType="tmRoot"/>
       </p:par>
     </p:tnLst>
   </p:timing>
@@ -1767,14 +4213,14 @@
           </a:ln>
           <a:extLst>
             <a:ext uri="{909E8E84-426E-40dd-AFC4-6F175D3DCCD1}">
-              <a14:hiddenFill xmlns:a14="http://schemas.microsoft.com/office/drawing/2010/main">
+              <a14:hiddenFill xmlns:a14="http://schemas.microsoft.com/office/drawing/2010/main" xmlns="">
                 <a:solidFill>
                   <a:srgbClr val="FFFFFF"/>
                 </a:solidFill>
               </a14:hiddenFill>
             </a:ext>
             <a:ext uri="{91240B29-F687-4f45-9708-019B960494DF}">
-              <a14:hiddenLine xmlns:a14="http://schemas.microsoft.com/office/drawing/2010/main" w="9525">
+              <a14:hiddenLine xmlns:a14="http://schemas.microsoft.com/office/drawing/2010/main" xmlns="" w="9525">
                 <a:solidFill>
                   <a:srgbClr val="000000"/>
                 </a:solidFill>
@@ -1996,14 +4442,6 @@
               </a:rPr>
               <a:t>Future improvements</a:t>
             </a:r>
-            <a:endParaRPr lang="en-US" sz="3600" dirty="0" smtClean="0">
-              <a:solidFill>
-                <a:srgbClr val="00A6D6"/>
-              </a:solidFill>
-              <a:latin typeface="Arial"/>
-              <a:ea typeface="MS PGothic" charset="0"/>
-              <a:cs typeface="Arial"/>
-            </a:endParaRPr>
           </a:p>
         </p:txBody>
       </p:sp>
@@ -2016,7 +4454,7 @@
           <p:nvPr/>
         </p:nvPicPr>
         <p:blipFill>
-          <a:blip r:embed="rId2">
+          <a:blip r:embed="rId3">
             <a:extLst>
               <a:ext uri="{28A0092B-C50C-407E-A947-70E740481C1C}">
                 <a14:useLocalDpi xmlns:a14="http://schemas.microsoft.com/office/drawing/2010/main" val="0"/>
@@ -2050,7 +4488,7 @@
   <p:timing>
     <p:tnLst>
       <p:par>
-        <p:cTn xmlns:p14="http://schemas.microsoft.com/office/powerpoint/2010/main" id="1" dur="indefinite" restart="never" nodeType="tmRoot"/>
+        <p:cTn id="1" dur="indefinite" restart="never" nodeType="tmRoot"/>
       </p:par>
     </p:tnLst>
   </p:timing>
@@ -2122,14 +4560,6 @@
               </a:rPr>
               <a:t>Demo</a:t>
             </a:r>
-            <a:endParaRPr lang="en-US" sz="3600" dirty="0" smtClean="0">
-              <a:solidFill>
-                <a:srgbClr val="00A6D6"/>
-              </a:solidFill>
-              <a:latin typeface="Arial"/>
-              <a:ea typeface="MS PGothic" charset="0"/>
-              <a:cs typeface="Arial"/>
-            </a:endParaRPr>
           </a:p>
         </p:txBody>
       </p:sp>
@@ -2176,7 +4606,7 @@
   <p:timing>
     <p:tnLst>
       <p:par>
-        <p:cTn xmlns:p14="http://schemas.microsoft.com/office/powerpoint/2010/main" id="1" dur="indefinite" restart="never" nodeType="tmRoot"/>
+        <p:cTn id="1" dur="indefinite" restart="never" nodeType="tmRoot"/>
       </p:par>
     </p:tnLst>
   </p:timing>
@@ -2248,14 +4678,6 @@
               </a:rPr>
               <a:t>Demo (backup)</a:t>
             </a:r>
-            <a:endParaRPr lang="en-US" sz="3600" dirty="0" smtClean="0">
-              <a:solidFill>
-                <a:srgbClr val="00A6D6"/>
-              </a:solidFill>
-              <a:latin typeface="Arial"/>
-              <a:ea typeface="MS PGothic" charset="0"/>
-              <a:cs typeface="Arial"/>
-            </a:endParaRPr>
           </a:p>
         </p:txBody>
       </p:sp>
@@ -2340,7 +4762,7 @@
   <p:timing>
     <p:tnLst>
       <p:par>
-        <p:cTn xmlns:p14="http://schemas.microsoft.com/office/powerpoint/2010/main" id="1" dur="indefinite" restart="never" nodeType="tmRoot"/>
+        <p:cTn id="1" dur="indefinite" restart="never" nodeType="tmRoot"/>
       </p:par>
     </p:tnLst>
   </p:timing>
@@ -2412,14 +4834,6 @@
               </a:rPr>
               <a:t>End</a:t>
             </a:r>
-            <a:endParaRPr lang="en-US" sz="3600" dirty="0" smtClean="0">
-              <a:solidFill>
-                <a:srgbClr val="00A6D6"/>
-              </a:solidFill>
-              <a:latin typeface="Arial"/>
-              <a:ea typeface="MS PGothic" charset="0"/>
-              <a:cs typeface="Arial"/>
-            </a:endParaRPr>
           </a:p>
         </p:txBody>
       </p:sp>
@@ -2520,7 +4934,7 @@
   <p:timing>
     <p:tnLst>
       <p:par>
-        <p:cTn xmlns:p14="http://schemas.microsoft.com/office/powerpoint/2010/main" id="1" dur="indefinite" restart="never" nodeType="tmRoot"/>
+        <p:cTn id="1" dur="indefinite" restart="never" nodeType="tmRoot"/>
       </p:par>
     </p:tnLst>
   </p:timing>
@@ -2601,7 +5015,7 @@
           <p:nvPr/>
         </p:nvPicPr>
         <p:blipFill>
-          <a:blip r:embed="rId2">
+          <a:blip r:embed="rId3">
             <a:extLst>
               <a:ext uri="{28A0092B-C50C-407E-A947-70E740481C1C}">
                 <a14:useLocalDpi xmlns:a14="http://schemas.microsoft.com/office/drawing/2010/main" val="0"/>
@@ -2644,14 +5058,14 @@
           </a:ln>
           <a:extLst>
             <a:ext uri="{909E8E84-426E-40dd-AFC4-6F175D3DCCD1}">
-              <a14:hiddenFill xmlns:a14="http://schemas.microsoft.com/office/drawing/2010/main">
+              <a14:hiddenFill xmlns:a14="http://schemas.microsoft.com/office/drawing/2010/main" xmlns="">
                 <a:solidFill>
                   <a:srgbClr val="FFFFFF"/>
                 </a:solidFill>
               </a14:hiddenFill>
             </a:ext>
             <a:ext uri="{91240B29-F687-4f45-9708-019B960494DF}">
-              <a14:hiddenLine xmlns:a14="http://schemas.microsoft.com/office/drawing/2010/main" w="9525">
+              <a14:hiddenLine xmlns:a14="http://schemas.microsoft.com/office/drawing/2010/main" xmlns="" w="9525">
                 <a:solidFill>
                   <a:srgbClr val="000000"/>
                 </a:solidFill>
@@ -2895,14 +5309,6 @@
               </a:rPr>
               <a:t>Part two</a:t>
             </a:r>
-            <a:endParaRPr lang="en-US" sz="3600" dirty="0" smtClean="0">
-              <a:solidFill>
-                <a:srgbClr val="00A6D6"/>
-              </a:solidFill>
-              <a:latin typeface="Arial"/>
-              <a:ea typeface="MS PGothic" charset="0"/>
-              <a:cs typeface="Arial"/>
-            </a:endParaRPr>
           </a:p>
         </p:txBody>
       </p:sp>
@@ -2919,7 +5325,7 @@
   <p:timing>
     <p:tnLst>
       <p:par>
-        <p:cTn xmlns:p14="http://schemas.microsoft.com/office/powerpoint/2010/main" id="1" dur="indefinite" restart="never" nodeType="tmRoot"/>
+        <p:cTn id="1" dur="indefinite" restart="never" nodeType="tmRoot"/>
       </p:par>
     </p:tnLst>
   </p:timing>
@@ -3000,7 +5406,7 @@
           <p:nvPr/>
         </p:nvPicPr>
         <p:blipFill>
-          <a:blip r:embed="rId2">
+          <a:blip r:embed="rId3">
             <a:extLst>
               <a:ext uri="{28A0092B-C50C-407E-A947-70E740481C1C}">
                 <a14:useLocalDpi xmlns:a14="http://schemas.microsoft.com/office/drawing/2010/main" val="0"/>
@@ -3043,14 +5449,14 @@
           </a:ln>
           <a:extLst>
             <a:ext uri="{909E8E84-426E-40dd-AFC4-6F175D3DCCD1}">
-              <a14:hiddenFill xmlns:a14="http://schemas.microsoft.com/office/drawing/2010/main">
+              <a14:hiddenFill xmlns:a14="http://schemas.microsoft.com/office/drawing/2010/main" xmlns="">
                 <a:solidFill>
                   <a:srgbClr val="FFFFFF"/>
                 </a:solidFill>
               </a14:hiddenFill>
             </a:ext>
             <a:ext uri="{91240B29-F687-4f45-9708-019B960494DF}">
-              <a14:hiddenLine xmlns:a14="http://schemas.microsoft.com/office/drawing/2010/main" w="9525">
+              <a14:hiddenLine xmlns:a14="http://schemas.microsoft.com/office/drawing/2010/main" xmlns="" w="9525">
                 <a:solidFill>
                   <a:srgbClr val="000000"/>
                 </a:solidFill>
@@ -3358,14 +5764,14 @@
           </a:ln>
           <a:extLst>
             <a:ext uri="{909E8E84-426E-40dd-AFC4-6F175D3DCCD1}">
-              <a14:hiddenFill xmlns:a14="http://schemas.microsoft.com/office/drawing/2010/main">
+              <a14:hiddenFill xmlns:a14="http://schemas.microsoft.com/office/drawing/2010/main" xmlns="">
                 <a:solidFill>
                   <a:srgbClr val="FFFFFF"/>
                 </a:solidFill>
               </a14:hiddenFill>
             </a:ext>
             <a:ext uri="{91240B29-F687-4f45-9708-019B960494DF}">
-              <a14:hiddenLine xmlns:a14="http://schemas.microsoft.com/office/drawing/2010/main" w="9525">
+              <a14:hiddenLine xmlns:a14="http://schemas.microsoft.com/office/drawing/2010/main" xmlns="" w="9525">
                 <a:solidFill>
                   <a:srgbClr val="000000"/>
                 </a:solidFill>
@@ -3578,7 +5984,7 @@
   <p:timing>
     <p:tnLst>
       <p:par>
-        <p:cTn xmlns:p14="http://schemas.microsoft.com/office/powerpoint/2010/main" id="1" dur="indefinite" restart="never" nodeType="tmRoot"/>
+        <p:cTn id="1" dur="indefinite" restart="never" nodeType="tmRoot"/>
       </p:par>
     </p:tnLst>
   </p:timing>
@@ -3659,7 +6065,7 @@
           <p:nvPr/>
         </p:nvPicPr>
         <p:blipFill>
-          <a:blip r:embed="rId2">
+          <a:blip r:embed="rId3">
             <a:extLst>
               <a:ext uri="{28A0092B-C50C-407E-A947-70E740481C1C}">
                 <a14:useLocalDpi xmlns:a14="http://schemas.microsoft.com/office/drawing/2010/main" val="0"/>
@@ -3702,14 +6108,14 @@
           </a:ln>
           <a:extLst>
             <a:ext uri="{909E8E84-426E-40dd-AFC4-6F175D3DCCD1}">
-              <a14:hiddenFill xmlns:a14="http://schemas.microsoft.com/office/drawing/2010/main">
+              <a14:hiddenFill xmlns:a14="http://schemas.microsoft.com/office/drawing/2010/main" xmlns="">
                 <a:solidFill>
                   <a:srgbClr val="FFFFFF"/>
                 </a:solidFill>
               </a14:hiddenFill>
             </a:ext>
             <a:ext uri="{91240B29-F687-4f45-9708-019B960494DF}">
-              <a14:hiddenLine xmlns:a14="http://schemas.microsoft.com/office/drawing/2010/main" w="9525">
+              <a14:hiddenLine xmlns:a14="http://schemas.microsoft.com/office/drawing/2010/main" xmlns="" w="9525">
                 <a:solidFill>
                   <a:srgbClr val="000000"/>
                 </a:solidFill>
@@ -3931,14 +6337,6 @@
               </a:rPr>
               <a:t>Generics problem</a:t>
             </a:r>
-            <a:endParaRPr lang="en-US" sz="3600" dirty="0" smtClean="0">
-              <a:solidFill>
-                <a:srgbClr val="00A6D6"/>
-              </a:solidFill>
-              <a:latin typeface="Arial"/>
-              <a:ea typeface="MS PGothic" charset="0"/>
-              <a:cs typeface="Arial"/>
-            </a:endParaRPr>
           </a:p>
         </p:txBody>
       </p:sp>
@@ -3955,7 +6353,7 @@
   <p:timing>
     <p:tnLst>
       <p:par>
-        <p:cTn xmlns:p14="http://schemas.microsoft.com/office/powerpoint/2010/main" id="1" dur="indefinite" restart="never" nodeType="tmRoot"/>
+        <p:cTn id="1" dur="indefinite" restart="never" nodeType="tmRoot"/>
       </p:par>
     </p:tnLst>
   </p:timing>
@@ -4036,7 +6434,7 @@
           <p:nvPr/>
         </p:nvPicPr>
         <p:blipFill>
-          <a:blip r:embed="rId2">
+          <a:blip r:embed="rId3">
             <a:extLst>
               <a:ext uri="{28A0092B-C50C-407E-A947-70E740481C1C}">
                 <a14:useLocalDpi xmlns:a14="http://schemas.microsoft.com/office/drawing/2010/main" val="0"/>
@@ -4079,14 +6477,14 @@
           </a:ln>
           <a:extLst>
             <a:ext uri="{909E8E84-426E-40dd-AFC4-6F175D3DCCD1}">
-              <a14:hiddenFill xmlns:a14="http://schemas.microsoft.com/office/drawing/2010/main">
+              <a14:hiddenFill xmlns:a14="http://schemas.microsoft.com/office/drawing/2010/main" xmlns="">
                 <a:solidFill>
                   <a:srgbClr val="FFFFFF"/>
                 </a:solidFill>
               </a14:hiddenFill>
             </a:ext>
             <a:ext uri="{91240B29-F687-4f45-9708-019B960494DF}">
-              <a14:hiddenLine xmlns:a14="http://schemas.microsoft.com/office/drawing/2010/main" w="9525">
+              <a14:hiddenLine xmlns:a14="http://schemas.microsoft.com/office/drawing/2010/main" xmlns="" w="9525">
                 <a:solidFill>
                   <a:srgbClr val="000000"/>
                 </a:solidFill>
@@ -4304,14 +6702,6 @@
               </a:rPr>
               <a:t>Maintaining simplicity</a:t>
             </a:r>
-            <a:endParaRPr lang="en-US" sz="3600" dirty="0" smtClean="0">
-              <a:solidFill>
-                <a:srgbClr val="00A6D6"/>
-              </a:solidFill>
-              <a:latin typeface="Arial"/>
-              <a:ea typeface="MS PGothic" charset="0"/>
-              <a:cs typeface="Arial"/>
-            </a:endParaRPr>
           </a:p>
         </p:txBody>
       </p:sp>
@@ -4328,7 +6718,7 @@
   <p:timing>
     <p:tnLst>
       <p:par>
-        <p:cTn xmlns:p14="http://schemas.microsoft.com/office/powerpoint/2010/main" id="1" dur="indefinite" restart="never" nodeType="tmRoot"/>
+        <p:cTn id="1" dur="indefinite" restart="never" nodeType="tmRoot"/>
       </p:par>
     </p:tnLst>
   </p:timing>
@@ -4409,7 +6799,7 @@
           <p:nvPr/>
         </p:nvPicPr>
         <p:blipFill>
-          <a:blip r:embed="rId2">
+          <a:blip r:embed="rId3">
             <a:extLst>
               <a:ext uri="{28A0092B-C50C-407E-A947-70E740481C1C}">
                 <a14:useLocalDpi xmlns:a14="http://schemas.microsoft.com/office/drawing/2010/main" val="0"/>
@@ -4452,14 +6842,14 @@
           </a:ln>
           <a:extLst>
             <a:ext uri="{909E8E84-426E-40dd-AFC4-6F175D3DCCD1}">
-              <a14:hiddenFill xmlns:a14="http://schemas.microsoft.com/office/drawing/2010/main">
+              <a14:hiddenFill xmlns:a14="http://schemas.microsoft.com/office/drawing/2010/main" xmlns="">
                 <a:solidFill>
                   <a:srgbClr val="FFFFFF"/>
                 </a:solidFill>
               </a14:hiddenFill>
             </a:ext>
             <a:ext uri="{91240B29-F687-4f45-9708-019B960494DF}">
-              <a14:hiddenLine xmlns:a14="http://schemas.microsoft.com/office/drawing/2010/main" w="9525">
+              <a14:hiddenLine xmlns:a14="http://schemas.microsoft.com/office/drawing/2010/main" xmlns="" w="9525">
                 <a:solidFill>
                   <a:srgbClr val="000000"/>
                 </a:solidFill>
@@ -4652,14 +7042,6 @@
               </a:rPr>
               <a:t>Extended demonstration</a:t>
             </a:r>
-            <a:endParaRPr lang="en-US" sz="3600" dirty="0" smtClean="0">
-              <a:solidFill>
-                <a:srgbClr val="00A6D6"/>
-              </a:solidFill>
-              <a:latin typeface="Arial"/>
-              <a:ea typeface="MS PGothic" charset="0"/>
-              <a:cs typeface="Arial"/>
-            </a:endParaRPr>
           </a:p>
         </p:txBody>
       </p:sp>
@@ -4672,7 +7054,7 @@
           <p:nvPr/>
         </p:nvPicPr>
         <p:blipFill>
-          <a:blip r:embed="rId3">
+          <a:blip r:embed="rId4">
             <a:extLst>
               <a:ext uri="{28A0092B-C50C-407E-A947-70E740481C1C}">
                 <a14:useLocalDpi xmlns:a14="http://schemas.microsoft.com/office/drawing/2010/main" val="0"/>
@@ -4706,7 +7088,7 @@
   <p:timing>
     <p:tnLst>
       <p:par>
-        <p:cTn xmlns:p14="http://schemas.microsoft.com/office/powerpoint/2010/main" id="1" dur="indefinite" restart="never" nodeType="tmRoot"/>
+        <p:cTn id="1" dur="indefinite" restart="never" nodeType="tmRoot"/>
       </p:par>
     </p:tnLst>
   </p:timing>
@@ -4752,14 +7134,14 @@
           </a:ln>
           <a:extLst>
             <a:ext uri="{909E8E84-426E-40dd-AFC4-6F175D3DCCD1}">
-              <a14:hiddenFill xmlns:a14="http://schemas.microsoft.com/office/drawing/2010/main">
+              <a14:hiddenFill xmlns:a14="http://schemas.microsoft.com/office/drawing/2010/main" xmlns="">
                 <a:solidFill>
                   <a:srgbClr val="FFFFFF"/>
                 </a:solidFill>
               </a14:hiddenFill>
             </a:ext>
             <a:ext uri="{91240B29-F687-4f45-9708-019B960494DF}">
-              <a14:hiddenLine xmlns:a14="http://schemas.microsoft.com/office/drawing/2010/main" w="9525">
+              <a14:hiddenLine xmlns:a14="http://schemas.microsoft.com/office/drawing/2010/main" xmlns="" w="9525">
                 <a:solidFill>
                   <a:srgbClr val="000000"/>
                 </a:solidFill>
@@ -5043,7 +7425,7 @@
           <p:nvPr/>
         </p:nvPicPr>
         <p:blipFill>
-          <a:blip r:embed="rId2">
+          <a:blip r:embed="rId3">
             <a:extLst>
               <a:ext uri="{28A0092B-C50C-407E-A947-70E740481C1C}">
                 <a14:useLocalDpi xmlns:a14="http://schemas.microsoft.com/office/drawing/2010/main" val="0"/>
@@ -5077,7 +7459,7 @@
   <p:timing>
     <p:tnLst>
       <p:par>
-        <p:cTn xmlns:p14="http://schemas.microsoft.com/office/powerpoint/2010/main" id="1" dur="indefinite" restart="never" nodeType="tmRoot"/>
+        <p:cTn id="1" dur="indefinite" restart="never" nodeType="tmRoot"/>
       </p:par>
     </p:tnLst>
   </p:timing>
@@ -5123,14 +7505,14 @@
           </a:ln>
           <a:extLst>
             <a:ext uri="{909E8E84-426E-40dd-AFC4-6F175D3DCCD1}">
-              <a14:hiddenFill xmlns:a14="http://schemas.microsoft.com/office/drawing/2010/main">
+              <a14:hiddenFill xmlns:a14="http://schemas.microsoft.com/office/drawing/2010/main" xmlns="">
                 <a:solidFill>
                   <a:srgbClr val="FFFFFF"/>
                 </a:solidFill>
               </a14:hiddenFill>
             </a:ext>
             <a:ext uri="{91240B29-F687-4f45-9708-019B960494DF}">
-              <a14:hiddenLine xmlns:a14="http://schemas.microsoft.com/office/drawing/2010/main" w="9525">
+              <a14:hiddenLine xmlns:a14="http://schemas.microsoft.com/office/drawing/2010/main" xmlns="" w="9525">
                 <a:solidFill>
                   <a:srgbClr val="000000"/>
                 </a:solidFill>
@@ -5299,12 +7681,6 @@
               </a:rPr>
               <a:t> disease</a:t>
             </a:r>
-            <a:endParaRPr lang="en-US" sz="2400" dirty="0">
-              <a:latin typeface="Arial"/>
-              <a:ea typeface="ヒラギノ角ゴ ProN W3" charset="0"/>
-              <a:cs typeface="Arial"/>
-              <a:sym typeface="Tahoma" charset="0"/>
-            </a:endParaRPr>
           </a:p>
         </p:txBody>
       </p:sp>
@@ -5356,14 +7732,6 @@
               </a:rPr>
               <a:t>The ADMIRE project</a:t>
             </a:r>
-            <a:endParaRPr lang="en-US" sz="3600" dirty="0" smtClean="0">
-              <a:solidFill>
-                <a:srgbClr val="00A6D6"/>
-              </a:solidFill>
-              <a:latin typeface="Arial"/>
-              <a:ea typeface="MS PGothic" charset="0"/>
-              <a:cs typeface="Arial"/>
-            </a:endParaRPr>
           </a:p>
         </p:txBody>
       </p:sp>
@@ -5376,7 +7744,7 @@
           <p:nvPr/>
         </p:nvPicPr>
         <p:blipFill>
-          <a:blip r:embed="rId2">
+          <a:blip r:embed="rId3">
             <a:extLst>
               <a:ext uri="{28A0092B-C50C-407E-A947-70E740481C1C}">
                 <a14:useLocalDpi xmlns:a14="http://schemas.microsoft.com/office/drawing/2010/main" val="0"/>
@@ -5419,14 +7787,14 @@
           </a:ln>
           <a:extLst>
             <a:ext uri="{909E8E84-426E-40dd-AFC4-6F175D3DCCD1}">
-              <a14:hiddenFill xmlns:a14="http://schemas.microsoft.com/office/drawing/2010/main">
+              <a14:hiddenFill xmlns:a14="http://schemas.microsoft.com/office/drawing/2010/main" xmlns="">
                 <a:solidFill>
                   <a:srgbClr val="FFFFFF"/>
                 </a:solidFill>
               </a14:hiddenFill>
             </a:ext>
             <a:ext uri="{91240B29-F687-4f45-9708-019B960494DF}">
-              <a14:hiddenLine xmlns:a14="http://schemas.microsoft.com/office/drawing/2010/main" w="9525">
+              <a14:hiddenLine xmlns:a14="http://schemas.microsoft.com/office/drawing/2010/main" xmlns="" w="9525">
                 <a:solidFill>
                   <a:srgbClr val="000000"/>
                 </a:solidFill>
@@ -5634,7 +8002,7 @@
   <p:timing>
     <p:tnLst>
       <p:par>
-        <p:cTn xmlns:p14="http://schemas.microsoft.com/office/powerpoint/2010/main" id="1" dur="indefinite" restart="never" nodeType="tmRoot"/>
+        <p:cTn id="1" dur="indefinite" restart="never" nodeType="tmRoot"/>
       </p:par>
     </p:tnLst>
   </p:timing>
@@ -5680,14 +8048,14 @@
           </a:ln>
           <a:extLst>
             <a:ext uri="{909E8E84-426E-40dd-AFC4-6F175D3DCCD1}">
-              <a14:hiddenFill xmlns:a14="http://schemas.microsoft.com/office/drawing/2010/main">
+              <a14:hiddenFill xmlns:a14="http://schemas.microsoft.com/office/drawing/2010/main" xmlns="">
                 <a:solidFill>
                   <a:srgbClr val="FFFFFF"/>
                 </a:solidFill>
               </a14:hiddenFill>
             </a:ext>
             <a:ext uri="{91240B29-F687-4f45-9708-019B960494DF}">
-              <a14:hiddenLine xmlns:a14="http://schemas.microsoft.com/office/drawing/2010/main" w="9525">
+              <a14:hiddenLine xmlns:a14="http://schemas.microsoft.com/office/drawing/2010/main" xmlns="" w="9525">
                 <a:solidFill>
                   <a:srgbClr val="000000"/>
                 </a:solidFill>
@@ -5951,14 +8319,6 @@
               </a:rPr>
               <a:t>Our task</a:t>
             </a:r>
-            <a:endParaRPr lang="en-US" sz="3600" dirty="0" smtClean="0">
-              <a:solidFill>
-                <a:srgbClr val="00A6D6"/>
-              </a:solidFill>
-              <a:latin typeface="Arial"/>
-              <a:ea typeface="MS PGothic" charset="0"/>
-              <a:cs typeface="Arial"/>
-            </a:endParaRPr>
           </a:p>
         </p:txBody>
       </p:sp>
@@ -5971,7 +8331,7 @@
           <p:nvPr/>
         </p:nvPicPr>
         <p:blipFill>
-          <a:blip r:embed="rId2">
+          <a:blip r:embed="rId3">
             <a:extLst>
               <a:ext uri="{28A0092B-C50C-407E-A947-70E740481C1C}">
                 <a14:useLocalDpi xmlns:a14="http://schemas.microsoft.com/office/drawing/2010/main" val="0"/>
@@ -6005,7 +8365,7 @@
   <p:timing>
     <p:tnLst>
       <p:par>
-        <p:cTn xmlns:p14="http://schemas.microsoft.com/office/powerpoint/2010/main" id="1" dur="indefinite" restart="never" nodeType="tmRoot"/>
+        <p:cTn id="1" dur="indefinite" restart="never" nodeType="tmRoot"/>
       </p:par>
     </p:tnLst>
   </p:timing>
@@ -6077,14 +8437,6 @@
               </a:rPr>
               <a:t>Our task – Why?</a:t>
             </a:r>
-            <a:endParaRPr lang="en-US" sz="3600" dirty="0" smtClean="0">
-              <a:solidFill>
-                <a:srgbClr val="00A6D6"/>
-              </a:solidFill>
-              <a:latin typeface="Arial"/>
-              <a:ea typeface="MS PGothic" charset="0"/>
-              <a:cs typeface="Arial"/>
-            </a:endParaRPr>
           </a:p>
         </p:txBody>
       </p:sp>
@@ -6097,7 +8449,7 @@
           <p:nvPr/>
         </p:nvPicPr>
         <p:blipFill>
-          <a:blip r:embed="rId2">
+          <a:blip r:embed="rId3">
             <a:extLst>
               <a:ext uri="{28A0092B-C50C-407E-A947-70E740481C1C}">
                 <a14:useLocalDpi xmlns:a14="http://schemas.microsoft.com/office/drawing/2010/main" val="0"/>
@@ -6140,14 +8492,14 @@
           </a:ln>
           <a:extLst>
             <a:ext uri="{909E8E84-426E-40dd-AFC4-6F175D3DCCD1}">
-              <a14:hiddenFill xmlns:a14="http://schemas.microsoft.com/office/drawing/2010/main">
+              <a14:hiddenFill xmlns:a14="http://schemas.microsoft.com/office/drawing/2010/main" xmlns="">
                 <a:solidFill>
                   <a:srgbClr val="FFFFFF"/>
                 </a:solidFill>
               </a14:hiddenFill>
             </a:ext>
             <a:ext uri="{91240B29-F687-4f45-9708-019B960494DF}">
-              <a14:hiddenLine xmlns:a14="http://schemas.microsoft.com/office/drawing/2010/main" w="9525">
+              <a14:hiddenLine xmlns:a14="http://schemas.microsoft.com/office/drawing/2010/main" xmlns="" w="9525">
                 <a:solidFill>
                   <a:srgbClr val="000000"/>
                 </a:solidFill>
@@ -6331,7 +8683,7 @@
   <p:timing>
     <p:tnLst>
       <p:par>
-        <p:cTn xmlns:p14="http://schemas.microsoft.com/office/powerpoint/2010/main" id="1" dur="indefinite" restart="never" nodeType="tmRoot"/>
+        <p:cTn id="1" dur="indefinite" restart="never" nodeType="tmRoot"/>
       </p:par>
     </p:tnLst>
   </p:timing>
@@ -6377,14 +8729,14 @@
           </a:ln>
           <a:extLst>
             <a:ext uri="{909E8E84-426E-40dd-AFC4-6F175D3DCCD1}">
-              <a14:hiddenFill xmlns:a14="http://schemas.microsoft.com/office/drawing/2010/main">
+              <a14:hiddenFill xmlns:a14="http://schemas.microsoft.com/office/drawing/2010/main" xmlns="">
                 <a:solidFill>
                   <a:srgbClr val="FFFFFF"/>
                 </a:solidFill>
               </a14:hiddenFill>
             </a:ext>
             <a:ext uri="{91240B29-F687-4f45-9708-019B960494DF}">
-              <a14:hiddenLine xmlns:a14="http://schemas.microsoft.com/office/drawing/2010/main" w="9525">
+              <a14:hiddenLine xmlns:a14="http://schemas.microsoft.com/office/drawing/2010/main" xmlns="" w="9525">
                 <a:solidFill>
                   <a:srgbClr val="000000"/>
                 </a:solidFill>
@@ -6522,12 +8874,6 @@
               </a:rPr>
               <a:t>Modules</a:t>
             </a:r>
-            <a:endParaRPr lang="en-US" sz="3600" dirty="0" smtClean="0">
-              <a:latin typeface="Arial"/>
-              <a:ea typeface="ヒラギノ角ゴ ProN W3" charset="0"/>
-              <a:cs typeface="Arial"/>
-              <a:sym typeface="Tahoma" charset="0"/>
-            </a:endParaRPr>
           </a:p>
           <a:p>
             <a:pPr marL="571500" indent="-571500">
@@ -6573,12 +8919,6 @@
               </a:rPr>
               <a:t>iew</a:t>
             </a:r>
-            <a:endParaRPr lang="en-US" sz="3600" dirty="0" smtClean="0">
-              <a:latin typeface="Arial"/>
-              <a:ea typeface="ヒラギノ角ゴ ProN W3" charset="0"/>
-              <a:cs typeface="Arial"/>
-              <a:sym typeface="Tahoma" charset="0"/>
-            </a:endParaRPr>
           </a:p>
           <a:p>
             <a:pPr marL="571500" indent="-571500">
@@ -6698,14 +9038,6 @@
               </a:rPr>
               <a:t>Final product</a:t>
             </a:r>
-            <a:endParaRPr lang="en-US" sz="3600" dirty="0" smtClean="0">
-              <a:solidFill>
-                <a:srgbClr val="00A6D6"/>
-              </a:solidFill>
-              <a:latin typeface="Arial"/>
-              <a:ea typeface="MS PGothic" charset="0"/>
-              <a:cs typeface="Arial"/>
-            </a:endParaRPr>
           </a:p>
         </p:txBody>
       </p:sp>
@@ -6718,7 +9050,7 @@
           <p:nvPr/>
         </p:nvPicPr>
         <p:blipFill>
-          <a:blip r:embed="rId2">
+          <a:blip r:embed="rId3">
             <a:extLst>
               <a:ext uri="{28A0092B-C50C-407E-A947-70E740481C1C}">
                 <a14:useLocalDpi xmlns:a14="http://schemas.microsoft.com/office/drawing/2010/main" val="0"/>
@@ -6752,7 +9084,7 @@
   <p:timing>
     <p:tnLst>
       <p:par>
-        <p:cTn xmlns:p14="http://schemas.microsoft.com/office/powerpoint/2010/main" id="1" dur="indefinite" restart="never" nodeType="tmRoot"/>
+        <p:cTn id="1" dur="indefinite" restart="never" nodeType="tmRoot"/>
       </p:par>
     </p:tnLst>
   </p:timing>
@@ -6798,14 +9130,14 @@
           </a:ln>
           <a:extLst>
             <a:ext uri="{909E8E84-426E-40dd-AFC4-6F175D3DCCD1}">
-              <a14:hiddenFill xmlns:a14="http://schemas.microsoft.com/office/drawing/2010/main">
+              <a14:hiddenFill xmlns:a14="http://schemas.microsoft.com/office/drawing/2010/main" xmlns="">
                 <a:solidFill>
                   <a:srgbClr val="FFFFFF"/>
                 </a:solidFill>
               </a14:hiddenFill>
             </a:ext>
             <a:ext uri="{91240B29-F687-4f45-9708-019B960494DF}">
-              <a14:hiddenLine xmlns:a14="http://schemas.microsoft.com/office/drawing/2010/main" w="9525">
+              <a14:hiddenLine xmlns:a14="http://schemas.microsoft.com/office/drawing/2010/main" xmlns="" w="9525">
                 <a:solidFill>
                   <a:srgbClr val="000000"/>
                 </a:solidFill>
@@ -6955,16 +9287,7 @@
                 <a:cs typeface="Arial"/>
                 <a:sym typeface="Tahoma" charset="0"/>
               </a:rPr>
-              <a:t>Define file </a:t>
-            </a:r>
-            <a:r>
-              <a:rPr lang="en-US" sz="3600" dirty="0" smtClean="0">
-                <a:latin typeface="Arial"/>
-                <a:ea typeface="ヒラギノ角ゴ ProN W3" charset="0"/>
-                <a:cs typeface="Arial"/>
-                <a:sym typeface="Tahoma" charset="0"/>
-              </a:rPr>
-              <a:t>structure with XML</a:t>
+              <a:t>Define file structure with XML</a:t>
             </a:r>
           </a:p>
           <a:p>
@@ -6985,12 +9308,6 @@
               </a:rPr>
               <a:t>View imported data</a:t>
             </a:r>
-            <a:endParaRPr lang="en-US" sz="3600" dirty="0" smtClean="0">
-              <a:latin typeface="Arial"/>
-              <a:ea typeface="ヒラギノ角ゴ ProN W3" charset="0"/>
-              <a:cs typeface="Arial"/>
-              <a:sym typeface="Tahoma" charset="0"/>
-            </a:endParaRPr>
           </a:p>
         </p:txBody>
       </p:sp>
@@ -7040,27 +9357,8 @@
                 <a:ea typeface="MS PGothic" charset="0"/>
                 <a:cs typeface="Arial"/>
               </a:rPr>
-              <a:t>Import &amp; </a:t>
-            </a:r>
-            <a:r>
-              <a:rPr lang="en-US" sz="3600" dirty="0" smtClean="0">
-                <a:solidFill>
-                  <a:srgbClr val="00A6D6"/>
-                </a:solidFill>
-                <a:latin typeface="Arial"/>
-                <a:ea typeface="MS PGothic" charset="0"/>
-                <a:cs typeface="Arial"/>
-              </a:rPr>
-              <a:t>view</a:t>
-            </a:r>
-            <a:endParaRPr lang="en-US" sz="3600" dirty="0" smtClean="0">
-              <a:solidFill>
-                <a:srgbClr val="00A6D6"/>
-              </a:solidFill>
-              <a:latin typeface="Arial"/>
-              <a:ea typeface="MS PGothic" charset="0"/>
-              <a:cs typeface="Arial"/>
-            </a:endParaRPr>
+              <a:t>Import &amp; view</a:t>
+            </a:r>
           </a:p>
         </p:txBody>
       </p:sp>
@@ -7073,7 +9371,7 @@
           <p:nvPr/>
         </p:nvPicPr>
         <p:blipFill>
-          <a:blip r:embed="rId2">
+          <a:blip r:embed="rId3">
             <a:extLst>
               <a:ext uri="{28A0092B-C50C-407E-A947-70E740481C1C}">
                 <a14:useLocalDpi xmlns:a14="http://schemas.microsoft.com/office/drawing/2010/main" val="0"/>
@@ -7107,7 +9405,7 @@
   <p:timing>
     <p:tnLst>
       <p:par>
-        <p:cTn xmlns:p14="http://schemas.microsoft.com/office/powerpoint/2010/main" id="1" dur="indefinite" restart="never" nodeType="tmRoot"/>
+        <p:cTn id="1" dur="indefinite" restart="never" nodeType="tmRoot"/>
       </p:par>
     </p:tnLst>
   </p:timing>
@@ -7153,14 +9451,14 @@
           </a:ln>
           <a:extLst>
             <a:ext uri="{909E8E84-426E-40dd-AFC4-6F175D3DCCD1}">
-              <a14:hiddenFill xmlns:a14="http://schemas.microsoft.com/office/drawing/2010/main">
+              <a14:hiddenFill xmlns:a14="http://schemas.microsoft.com/office/drawing/2010/main" xmlns="">
                 <a:solidFill>
                   <a:srgbClr val="FFFFFF"/>
                 </a:solidFill>
               </a14:hiddenFill>
             </a:ext>
             <a:ext uri="{91240B29-F687-4f45-9708-019B960494DF}">
-              <a14:hiddenLine xmlns:a14="http://schemas.microsoft.com/office/drawing/2010/main" w="9525">
+              <a14:hiddenLine xmlns:a14="http://schemas.microsoft.com/office/drawing/2010/main" xmlns="" w="9525">
                 <a:solidFill>
                   <a:srgbClr val="000000"/>
                 </a:solidFill>
@@ -7291,16 +9589,7 @@
                 <a:cs typeface="Arial"/>
                 <a:sym typeface="Tahoma" charset="0"/>
               </a:rPr>
-              <a:t>The </a:t>
-            </a:r>
-            <a:r>
-              <a:rPr lang="en-US" sz="3600" dirty="0" smtClean="0">
-                <a:latin typeface="Arial"/>
-                <a:ea typeface="ヒラギノ角ゴ ProN W3" charset="0"/>
-                <a:cs typeface="Arial"/>
-                <a:sym typeface="Tahoma" charset="0"/>
-              </a:rPr>
-              <a:t>C’s</a:t>
+              <a:t>The C’s</a:t>
             </a:r>
           </a:p>
           <a:p>
@@ -7362,12 +9651,6 @@
               </a:rPr>
               <a:t>Connections</a:t>
             </a:r>
-            <a:endParaRPr lang="en-US" sz="1800" dirty="0" smtClean="0">
-              <a:latin typeface="Arial"/>
-              <a:ea typeface="ヒラギノ角ゴ ProN W3" charset="0"/>
-              <a:cs typeface="Arial"/>
-              <a:sym typeface="Tahoma" charset="0"/>
-            </a:endParaRPr>
           </a:p>
           <a:p>
             <a:endParaRPr lang="en-US" sz="3600" dirty="0" smtClean="0">
@@ -7458,7 +9741,7 @@
           <p:nvPr/>
         </p:nvPicPr>
         <p:blipFill>
-          <a:blip r:embed="rId2">
+          <a:blip r:embed="rId3">
             <a:extLst>
               <a:ext uri="{28A0092B-C50C-407E-A947-70E740481C1C}">
                 <a14:useLocalDpi xmlns:a14="http://schemas.microsoft.com/office/drawing/2010/main" val="0"/>
@@ -7501,14 +9784,14 @@
           </a:ln>
           <a:extLst>
             <a:ext uri="{909E8E84-426E-40dd-AFC4-6F175D3DCCD1}">
-              <a14:hiddenFill xmlns:a14="http://schemas.microsoft.com/office/drawing/2010/main">
+              <a14:hiddenFill xmlns:a14="http://schemas.microsoft.com/office/drawing/2010/main" xmlns="">
                 <a:solidFill>
                   <a:srgbClr val="FFFFFF"/>
                 </a:solidFill>
               </a14:hiddenFill>
             </a:ext>
             <a:ext uri="{91240B29-F687-4f45-9708-019B960494DF}">
-              <a14:hiddenLine xmlns:a14="http://schemas.microsoft.com/office/drawing/2010/main" w="9525">
+              <a14:hiddenLine xmlns:a14="http://schemas.microsoft.com/office/drawing/2010/main" xmlns="" w="9525">
                 <a:solidFill>
                   <a:srgbClr val="000000"/>
                 </a:solidFill>
@@ -7701,12 +9984,6 @@
               </a:rPr>
               <a:t>Computations</a:t>
             </a:r>
-            <a:endParaRPr lang="en-US" sz="1800" dirty="0" smtClean="0">
-              <a:latin typeface="Arial"/>
-              <a:ea typeface="ヒラギノ角ゴ ProN W3" charset="0"/>
-              <a:cs typeface="Arial"/>
-              <a:sym typeface="Tahoma" charset="0"/>
-            </a:endParaRPr>
           </a:p>
         </p:txBody>
       </p:sp>
@@ -7723,7 +10000,7 @@
   <p:timing>
     <p:tnLst>
       <p:par>
-        <p:cTn xmlns:p14="http://schemas.microsoft.com/office/powerpoint/2010/main" id="1" dur="indefinite" restart="never" nodeType="tmRoot"/>
+        <p:cTn id="1" dur="indefinite" restart="never" nodeType="tmRoot"/>
       </p:par>
     </p:tnLst>
   </p:timing>
@@ -7769,14 +10046,14 @@
           </a:ln>
           <a:extLst>
             <a:ext uri="{909E8E84-426E-40dd-AFC4-6F175D3DCCD1}">
-              <a14:hiddenFill xmlns:a14="http://schemas.microsoft.com/office/drawing/2010/main">
+              <a14:hiddenFill xmlns:a14="http://schemas.microsoft.com/office/drawing/2010/main" xmlns="">
                 <a:solidFill>
                   <a:srgbClr val="FFFFFF"/>
                 </a:solidFill>
               </a14:hiddenFill>
             </a:ext>
             <a:ext uri="{91240B29-F687-4f45-9708-019B960494DF}">
-              <a14:hiddenLine xmlns:a14="http://schemas.microsoft.com/office/drawing/2010/main" w="9525">
+              <a14:hiddenLine xmlns:a14="http://schemas.microsoft.com/office/drawing/2010/main" xmlns="" w="9525">
                 <a:solidFill>
                   <a:srgbClr val="000000"/>
                 </a:solidFill>
@@ -7999,7 +10276,7 @@
           <p:nvPr/>
         </p:nvPicPr>
         <p:blipFill>
-          <a:blip r:embed="rId2">
+          <a:blip r:embed="rId3">
             <a:extLst>
               <a:ext uri="{28A0092B-C50C-407E-A947-70E740481C1C}">
                 <a14:useLocalDpi xmlns:a14="http://schemas.microsoft.com/office/drawing/2010/main" val="0"/>
@@ -8029,7 +10306,7 @@
           <p:nvPr/>
         </p:nvPicPr>
         <p:blipFill>
-          <a:blip r:embed="rId3">
+          <a:blip r:embed="rId4">
             <a:extLst>
               <a:ext uri="{28A0092B-C50C-407E-A947-70E740481C1C}">
                 <a14:useLocalDpi xmlns:a14="http://schemas.microsoft.com/office/drawing/2010/main" val="0"/>
@@ -8059,7 +10336,7 @@
           <p:nvPr/>
         </p:nvPicPr>
         <p:blipFill>
-          <a:blip r:embed="rId4">
+          <a:blip r:embed="rId5">
             <a:extLst>
               <a:ext uri="{28A0092B-C50C-407E-A947-70E740481C1C}">
                 <a14:useLocalDpi xmlns:a14="http://schemas.microsoft.com/office/drawing/2010/main" val="0"/>
@@ -8089,7 +10366,7 @@
           <p:nvPr/>
         </p:nvPicPr>
         <p:blipFill>
-          <a:blip r:embed="rId5">
+          <a:blip r:embed="rId6">
             <a:extLst>
               <a:ext uri="{28A0092B-C50C-407E-A947-70E740481C1C}">
                 <a14:useLocalDpi xmlns:a14="http://schemas.microsoft.com/office/drawing/2010/main" val="0"/>
@@ -8123,7 +10400,7 @@
   <p:timing>
     <p:tnLst>
       <p:par>
-        <p:cTn xmlns:p14="http://schemas.microsoft.com/office/powerpoint/2010/main" id="1" dur="indefinite" restart="never" nodeType="tmRoot"/>
+        <p:cTn id="1" dur="indefinite" restart="never" nodeType="tmRoot"/>
       </p:par>
     </p:tnLst>
   </p:timing>
@@ -8419,4 +10696,265 @@
   <a:objectDefaults/>
   <a:extraClrSchemeLst/>
 </a:theme>
+</file>
+
+<file path=ppt/theme/theme2.xml><?xml version="1.0" encoding="utf-8"?>
+<a:theme xmlns:a="http://schemas.openxmlformats.org/drawingml/2006/main" name="Office Theme">
+  <a:themeElements>
+    <a:clrScheme name="Office">
+      <a:dk1>
+        <a:sysClr val="windowText" lastClr="000000"/>
+      </a:dk1>
+      <a:lt1>
+        <a:sysClr val="window" lastClr="FFFFFF"/>
+      </a:lt1>
+      <a:dk2>
+        <a:srgbClr val="44546A"/>
+      </a:dk2>
+      <a:lt2>
+        <a:srgbClr val="E7E6E6"/>
+      </a:lt2>
+      <a:accent1>
+        <a:srgbClr val="5B9BD5"/>
+      </a:accent1>
+      <a:accent2>
+        <a:srgbClr val="ED7D31"/>
+      </a:accent2>
+      <a:accent3>
+        <a:srgbClr val="A5A5A5"/>
+      </a:accent3>
+      <a:accent4>
+        <a:srgbClr val="FFC000"/>
+      </a:accent4>
+      <a:accent5>
+        <a:srgbClr val="4472C4"/>
+      </a:accent5>
+      <a:accent6>
+        <a:srgbClr val="70AD47"/>
+      </a:accent6>
+      <a:hlink>
+        <a:srgbClr val="0563C1"/>
+      </a:hlink>
+      <a:folHlink>
+        <a:srgbClr val="954F72"/>
+      </a:folHlink>
+    </a:clrScheme>
+    <a:fontScheme name="Office">
+      <a:majorFont>
+        <a:latin typeface="Calibri Light" panose="020F0302020204030204"/>
+        <a:ea typeface=""/>
+        <a:cs typeface=""/>
+        <a:font script="Jpan" typeface="ＭＳ Ｐゴシック"/>
+        <a:font script="Hang" typeface="맑은 고딕"/>
+        <a:font script="Hans" typeface="宋体"/>
+        <a:font script="Hant" typeface="新細明體"/>
+        <a:font script="Arab" typeface="Times New Roman"/>
+        <a:font script="Hebr" typeface="Times New Roman"/>
+        <a:font script="Thai" typeface="Angsana New"/>
+        <a:font script="Ethi" typeface="Nyala"/>
+        <a:font script="Beng" typeface="Vrinda"/>
+        <a:font script="Gujr" typeface="Shruti"/>
+        <a:font script="Khmr" typeface="MoolBoran"/>
+        <a:font script="Knda" typeface="Tunga"/>
+        <a:font script="Guru" typeface="Raavi"/>
+        <a:font script="Cans" typeface="Euphemia"/>
+        <a:font script="Cher" typeface="Plantagenet Cherokee"/>
+        <a:font script="Yiii" typeface="Microsoft Yi Baiti"/>
+        <a:font script="Tibt" typeface="Microsoft Himalaya"/>
+        <a:font script="Thaa" typeface="MV Boli"/>
+        <a:font script="Deva" typeface="Mangal"/>
+        <a:font script="Telu" typeface="Gautami"/>
+        <a:font script="Taml" typeface="Latha"/>
+        <a:font script="Syrc" typeface="Estrangelo Edessa"/>
+        <a:font script="Orya" typeface="Kalinga"/>
+        <a:font script="Mlym" typeface="Kartika"/>
+        <a:font script="Laoo" typeface="DokChampa"/>
+        <a:font script="Sinh" typeface="Iskoola Pota"/>
+        <a:font script="Mong" typeface="Mongolian Baiti"/>
+        <a:font script="Viet" typeface="Times New Roman"/>
+        <a:font script="Uigh" typeface="Microsoft Uighur"/>
+        <a:font script="Geor" typeface="Sylfaen"/>
+      </a:majorFont>
+      <a:minorFont>
+        <a:latin typeface="Calibri" panose="020F0502020204030204"/>
+        <a:ea typeface=""/>
+        <a:cs typeface=""/>
+        <a:font script="Jpan" typeface="ＭＳ Ｐゴシック"/>
+        <a:font script="Hang" typeface="맑은 고딕"/>
+        <a:font script="Hans" typeface="宋体"/>
+        <a:font script="Hant" typeface="新細明體"/>
+        <a:font script="Arab" typeface="Arial"/>
+        <a:font script="Hebr" typeface="Arial"/>
+        <a:font script="Thai" typeface="Cordia New"/>
+        <a:font script="Ethi" typeface="Nyala"/>
+        <a:font script="Beng" typeface="Vrinda"/>
+        <a:font script="Gujr" typeface="Shruti"/>
+        <a:font script="Khmr" typeface="DaunPenh"/>
+        <a:font script="Knda" typeface="Tunga"/>
+        <a:font script="Guru" typeface="Raavi"/>
+        <a:font script="Cans" typeface="Euphemia"/>
+        <a:font script="Cher" typeface="Plantagenet Cherokee"/>
+        <a:font script="Yiii" typeface="Microsoft Yi Baiti"/>
+        <a:font script="Tibt" typeface="Microsoft Himalaya"/>
+        <a:font script="Thaa" typeface="MV Boli"/>
+        <a:font script="Deva" typeface="Mangal"/>
+        <a:font script="Telu" typeface="Gautami"/>
+        <a:font script="Taml" typeface="Latha"/>
+        <a:font script="Syrc" typeface="Estrangelo Edessa"/>
+        <a:font script="Orya" typeface="Kalinga"/>
+        <a:font script="Mlym" typeface="Kartika"/>
+        <a:font script="Laoo" typeface="DokChampa"/>
+        <a:font script="Sinh" typeface="Iskoola Pota"/>
+        <a:font script="Mong" typeface="Mongolian Baiti"/>
+        <a:font script="Viet" typeface="Arial"/>
+        <a:font script="Uigh" typeface="Microsoft Uighur"/>
+        <a:font script="Geor" typeface="Sylfaen"/>
+      </a:minorFont>
+    </a:fontScheme>
+    <a:fmtScheme name="Office">
+      <a:fillStyleLst>
+        <a:solidFill>
+          <a:schemeClr val="phClr"/>
+        </a:solidFill>
+        <a:gradFill rotWithShape="1">
+          <a:gsLst>
+            <a:gs pos="0">
+              <a:schemeClr val="phClr">
+                <a:lumMod val="110000"/>
+                <a:satMod val="105000"/>
+                <a:tint val="67000"/>
+              </a:schemeClr>
+            </a:gs>
+            <a:gs pos="50000">
+              <a:schemeClr val="phClr">
+                <a:lumMod val="105000"/>
+                <a:satMod val="103000"/>
+                <a:tint val="73000"/>
+              </a:schemeClr>
+            </a:gs>
+            <a:gs pos="100000">
+              <a:schemeClr val="phClr">
+                <a:lumMod val="105000"/>
+                <a:satMod val="109000"/>
+                <a:tint val="81000"/>
+              </a:schemeClr>
+            </a:gs>
+          </a:gsLst>
+          <a:lin ang="5400000" scaled="0"/>
+        </a:gradFill>
+        <a:gradFill rotWithShape="1">
+          <a:gsLst>
+            <a:gs pos="0">
+              <a:schemeClr val="phClr">
+                <a:satMod val="103000"/>
+                <a:lumMod val="102000"/>
+                <a:tint val="94000"/>
+              </a:schemeClr>
+            </a:gs>
+            <a:gs pos="50000">
+              <a:schemeClr val="phClr">
+                <a:satMod val="110000"/>
+                <a:lumMod val="100000"/>
+                <a:shade val="100000"/>
+              </a:schemeClr>
+            </a:gs>
+            <a:gs pos="100000">
+              <a:schemeClr val="phClr">
+                <a:lumMod val="99000"/>
+                <a:satMod val="120000"/>
+                <a:shade val="78000"/>
+              </a:schemeClr>
+            </a:gs>
+          </a:gsLst>
+          <a:lin ang="5400000" scaled="0"/>
+        </a:gradFill>
+      </a:fillStyleLst>
+      <a:lnStyleLst>
+        <a:ln w="6350" cap="flat" cmpd="sng" algn="ctr">
+          <a:solidFill>
+            <a:schemeClr val="phClr"/>
+          </a:solidFill>
+          <a:prstDash val="solid"/>
+          <a:miter lim="800000"/>
+        </a:ln>
+        <a:ln w="12700" cap="flat" cmpd="sng" algn="ctr">
+          <a:solidFill>
+            <a:schemeClr val="phClr"/>
+          </a:solidFill>
+          <a:prstDash val="solid"/>
+          <a:miter lim="800000"/>
+        </a:ln>
+        <a:ln w="19050" cap="flat" cmpd="sng" algn="ctr">
+          <a:solidFill>
+            <a:schemeClr val="phClr"/>
+          </a:solidFill>
+          <a:prstDash val="solid"/>
+          <a:miter lim="800000"/>
+        </a:ln>
+      </a:lnStyleLst>
+      <a:effectStyleLst>
+        <a:effectStyle>
+          <a:effectLst/>
+        </a:effectStyle>
+        <a:effectStyle>
+          <a:effectLst/>
+        </a:effectStyle>
+        <a:effectStyle>
+          <a:effectLst>
+            <a:outerShdw blurRad="57150" dist="19050" dir="5400000" algn="ctr" rotWithShape="0">
+              <a:srgbClr val="000000">
+                <a:alpha val="63000"/>
+              </a:srgbClr>
+            </a:outerShdw>
+          </a:effectLst>
+        </a:effectStyle>
+      </a:effectStyleLst>
+      <a:bgFillStyleLst>
+        <a:solidFill>
+          <a:schemeClr val="phClr"/>
+        </a:solidFill>
+        <a:solidFill>
+          <a:schemeClr val="phClr">
+            <a:tint val="95000"/>
+            <a:satMod val="170000"/>
+          </a:schemeClr>
+        </a:solidFill>
+        <a:gradFill rotWithShape="1">
+          <a:gsLst>
+            <a:gs pos="0">
+              <a:schemeClr val="phClr">
+                <a:tint val="93000"/>
+                <a:satMod val="150000"/>
+                <a:shade val="98000"/>
+                <a:lumMod val="102000"/>
+              </a:schemeClr>
+            </a:gs>
+            <a:gs pos="50000">
+              <a:schemeClr val="phClr">
+                <a:tint val="98000"/>
+                <a:satMod val="130000"/>
+                <a:shade val="90000"/>
+                <a:lumMod val="103000"/>
+              </a:schemeClr>
+            </a:gs>
+            <a:gs pos="100000">
+              <a:schemeClr val="phClr">
+                <a:shade val="63000"/>
+                <a:satMod val="120000"/>
+              </a:schemeClr>
+            </a:gs>
+          </a:gsLst>
+          <a:lin ang="5400000" scaled="0"/>
+        </a:gradFill>
+      </a:bgFillStyleLst>
+    </a:fmtScheme>
+  </a:themeElements>
+  <a:objectDefaults/>
+  <a:extraClrSchemeLst/>
+  <a:extLst>
+    <a:ext uri="{05A4C25C-085E-4340-85A3-A5531E510DB2}">
+      <thm15:themeFamily xmlns:thm15="http://schemas.microsoft.com/office/thememl/2012/main" name="Office Theme" id="{62F939B6-93AF-4DB8-9C6B-D6C7DFDC589F}" vid="{4A3C46E8-61CC-4603-A589-7422A47A8E4A}"/>
+    </a:ext>
+  </a:extLst>
+</a:theme>
 </file>
</xml_diff>